<commit_message>
last (?) changes to presentation mostly stylistic edits
</commit_message>
<xml_diff>
--- a/FxCop.pptx
+++ b/FxCop.pptx
@@ -232,7 +232,7 @@
           <a:p>
             <a:fld id="{99DDD968-B18B-4530-BF4A-77574F6DE493}" type="datetimeFigureOut">
               <a:rPr lang="en-US" smtClean="0"/>
-              <a:t>11/27/2013</a:t>
+              <a:t>12/4/2013</a:t>
             </a:fld>
             <a:endParaRPr lang="en-US"/>
           </a:p>
@@ -630,11 +630,24 @@
           <a:p>
             <a:r>
               <a:rPr lang="en-US" dirty="0" smtClean="0"/>
-              <a:t>Whatever code review policy you’ve got, it’s probably pretty useful</a:t>
+              <a:t>It’s a great example because the code is small enough to fit on a PowerPoint</a:t>
             </a:r>
             <a:r>
               <a:rPr lang="en-US" baseline="0" dirty="0" smtClean="0"/>
-              <a:t> to be able to quickly and reliably identify the stuff that’s most likely to be risky right off the bat.</a:t>
+              <a:t> slide</a:t>
+            </a:r>
+            <a:r>
+              <a:rPr lang="en-US" baseline="0" dirty="0" smtClean="0"/>
+              <a:t>.</a:t>
+            </a:r>
+          </a:p>
+          <a:p>
+            <a:endParaRPr lang="en-US" baseline="0" dirty="0" smtClean="0"/>
+          </a:p>
+          <a:p>
+            <a:r>
+              <a:rPr lang="en-US" baseline="0" dirty="0" smtClean="0"/>
+              <a:t>There’s also an XML file that has the message(s) for each rule, the priority, stuff like that…</a:t>
             </a:r>
             <a:endParaRPr lang="en-US" dirty="0"/>
           </a:p>
@@ -657,7 +670,7 @@
           <a:p>
             <a:fld id="{4BE216E4-4DA0-4231-B3A1-A1DCD2E90B1D}" type="slidenum">
               <a:rPr lang="en-US" smtClean="0"/>
-              <a:t>23</a:t>
+              <a:t>22</a:t>
             </a:fld>
             <a:endParaRPr lang="en-US"/>
           </a:p>
@@ -666,7 +679,7 @@
     </p:spTree>
     <p:extLst>
       <p:ext uri="{BB962C8B-B14F-4D97-AF65-F5344CB8AC3E}">
-        <p14:creationId xmlns:p14="http://schemas.microsoft.com/office/powerpoint/2010/main" val="3509897739"/>
+        <p14:creationId xmlns:p14="http://schemas.microsoft.com/office/powerpoint/2010/main" val="541026763"/>
       </p:ext>
     </p:extLst>
   </p:cSld>
@@ -720,6 +733,14 @@
           <a:bodyPr/>
           <a:lstStyle/>
           <a:p>
+            <a:r>
+              <a:rPr lang="en-US" dirty="0" smtClean="0"/>
+              <a:t>Whatever code review policy you’ve got, it’s probably pretty useful</a:t>
+            </a:r>
+            <a:r>
+              <a:rPr lang="en-US" baseline="0" dirty="0" smtClean="0"/>
+              <a:t> to be able to quickly and reliably identify the stuff that’s most likely to be risky right off the bat.</a:t>
+            </a:r>
             <a:endParaRPr lang="en-US" dirty="0"/>
           </a:p>
         </p:txBody>
@@ -741,7 +762,7 @@
           <a:p>
             <a:fld id="{4BE216E4-4DA0-4231-B3A1-A1DCD2E90B1D}" type="slidenum">
               <a:rPr lang="en-US" smtClean="0"/>
-              <a:t>24</a:t>
+              <a:t>23</a:t>
             </a:fld>
             <a:endParaRPr lang="en-US"/>
           </a:p>
@@ -750,7 +771,7 @@
     </p:spTree>
     <p:extLst>
       <p:ext uri="{BB962C8B-B14F-4D97-AF65-F5344CB8AC3E}">
-        <p14:creationId xmlns:p14="http://schemas.microsoft.com/office/powerpoint/2010/main" val="2492697890"/>
+        <p14:creationId xmlns:p14="http://schemas.microsoft.com/office/powerpoint/2010/main" val="3509897739"/>
       </p:ext>
     </p:extLst>
   </p:cSld>
@@ -804,22 +825,6 @@
           <a:bodyPr/>
           <a:lstStyle/>
           <a:p>
-            <a:r>
-              <a:rPr lang="en-US" dirty="0" smtClean="0"/>
-              <a:t>If you just do @</a:t>
-            </a:r>
-            <a:r>
-              <a:rPr lang="en-US" dirty="0" err="1" smtClean="0"/>
-              <a:t>myString</a:t>
-            </a:r>
-            <a:r>
-              <a:rPr lang="en-US" dirty="0" smtClean="0"/>
-              <a:t>,</a:t>
-            </a:r>
-            <a:r>
-              <a:rPr lang="en-US" baseline="0" dirty="0" smtClean="0"/>
-              <a:t> you don’t have to worry about XSS</a:t>
-            </a:r>
             <a:endParaRPr lang="en-US" dirty="0"/>
           </a:p>
         </p:txBody>
@@ -841,7 +846,7 @@
           <a:p>
             <a:fld id="{4BE216E4-4DA0-4231-B3A1-A1DCD2E90B1D}" type="slidenum">
               <a:rPr lang="en-US" smtClean="0"/>
-              <a:t>27</a:t>
+              <a:t>24</a:t>
             </a:fld>
             <a:endParaRPr lang="en-US"/>
           </a:p>
@@ -850,7 +855,7 @@
     </p:spTree>
     <p:extLst>
       <p:ext uri="{BB962C8B-B14F-4D97-AF65-F5344CB8AC3E}">
-        <p14:creationId xmlns:p14="http://schemas.microsoft.com/office/powerpoint/2010/main" val="2455160574"/>
+        <p14:creationId xmlns:p14="http://schemas.microsoft.com/office/powerpoint/2010/main" val="2492697890"/>
       </p:ext>
     </p:extLst>
   </p:cSld>
@@ -904,6 +909,22 @@
           <a:bodyPr/>
           <a:lstStyle/>
           <a:p>
+            <a:r>
+              <a:rPr lang="en-US" dirty="0" smtClean="0"/>
+              <a:t>If you just do @</a:t>
+            </a:r>
+            <a:r>
+              <a:rPr lang="en-US" dirty="0" err="1" smtClean="0"/>
+              <a:t>myString</a:t>
+            </a:r>
+            <a:r>
+              <a:rPr lang="en-US" dirty="0" smtClean="0"/>
+              <a:t>,</a:t>
+            </a:r>
+            <a:r>
+              <a:rPr lang="en-US" baseline="0" dirty="0" smtClean="0"/>
+              <a:t> you don’t have to worry about XSS</a:t>
+            </a:r>
             <a:endParaRPr lang="en-US" dirty="0"/>
           </a:p>
         </p:txBody>
@@ -925,7 +946,7 @@
           <a:p>
             <a:fld id="{4BE216E4-4DA0-4231-B3A1-A1DCD2E90B1D}" type="slidenum">
               <a:rPr lang="en-US" smtClean="0"/>
-              <a:t>28</a:t>
+              <a:t>27</a:t>
             </a:fld>
             <a:endParaRPr lang="en-US"/>
           </a:p>
@@ -934,7 +955,7 @@
     </p:spTree>
     <p:extLst>
       <p:ext uri="{BB962C8B-B14F-4D97-AF65-F5344CB8AC3E}">
-        <p14:creationId xmlns:p14="http://schemas.microsoft.com/office/powerpoint/2010/main" val="1092622198"/>
+        <p14:creationId xmlns:p14="http://schemas.microsoft.com/office/powerpoint/2010/main" val="2455160574"/>
       </p:ext>
     </p:extLst>
   </p:cSld>
@@ -988,14 +1009,6 @@
           <a:bodyPr/>
           <a:lstStyle/>
           <a:p>
-            <a:r>
-              <a:rPr lang="en-US" dirty="0" smtClean="0"/>
-              <a:t>The idea here is that you only have to review and ensure</a:t>
-            </a:r>
-            <a:r>
-              <a:rPr lang="en-US" baseline="0" dirty="0" smtClean="0"/>
-              <a:t> the safety in one place. With the first approach, any time the property is used is a potential for a new XSS vulnerability.</a:t>
-            </a:r>
             <a:endParaRPr lang="en-US" dirty="0"/>
           </a:p>
         </p:txBody>
@@ -1017,7 +1030,7 @@
           <a:p>
             <a:fld id="{4BE216E4-4DA0-4231-B3A1-A1DCD2E90B1D}" type="slidenum">
               <a:rPr lang="en-US" smtClean="0"/>
-              <a:t>29</a:t>
+              <a:t>28</a:t>
             </a:fld>
             <a:endParaRPr lang="en-US"/>
           </a:p>
@@ -1026,7 +1039,7 @@
     </p:spTree>
     <p:extLst>
       <p:ext uri="{BB962C8B-B14F-4D97-AF65-F5344CB8AC3E}">
-        <p14:creationId xmlns:p14="http://schemas.microsoft.com/office/powerpoint/2010/main" val="2294984584"/>
+        <p14:creationId xmlns:p14="http://schemas.microsoft.com/office/powerpoint/2010/main" val="1092622198"/>
       </p:ext>
     </p:extLst>
   </p:cSld>
@@ -1082,45 +1095,11 @@
           <a:p>
             <a:r>
               <a:rPr lang="en-US" dirty="0" smtClean="0"/>
-              <a:t>It’s hard to backtrack every variable</a:t>
+              <a:t>The idea here is that you only have to review and ensure</a:t>
             </a:r>
             <a:r>
               <a:rPr lang="en-US" baseline="0" dirty="0" smtClean="0"/>
-              <a:t> and make sure it’s coming from clean sources. Often things that are clean are incorrectly marked dirty because the code can’t figure it out.</a:t>
-            </a:r>
-          </a:p>
-          <a:p>
-            <a:endParaRPr lang="en-US" baseline="0" dirty="0" smtClean="0"/>
-          </a:p>
-          <a:p>
-            <a:r>
-              <a:rPr lang="en-US" baseline="0" dirty="0" smtClean="0"/>
-              <a:t>The first one will just tell you it’s untrusted because the parameter is dangerous. Really, what we want in this case is to flag when dangerous things </a:t>
-            </a:r>
-            <a:r>
-              <a:rPr lang="en-US" i="1" baseline="0" dirty="0" smtClean="0"/>
-              <a:t>go into</a:t>
-            </a:r>
-            <a:r>
-              <a:rPr lang="en-US" i="0" baseline="0" dirty="0" smtClean="0"/>
-              <a:t> this function.</a:t>
-            </a:r>
-          </a:p>
-          <a:p>
-            <a:endParaRPr lang="en-US" i="0" baseline="0" dirty="0" smtClean="0"/>
-          </a:p>
-          <a:p>
-            <a:r>
-              <a:rPr lang="en-US" i="0" baseline="0" dirty="0" smtClean="0"/>
-              <a:t>The second one will tell you that it’s untrusted from the moment you call the Build function. Really, what you want is to go </a:t>
-            </a:r>
-            <a:r>
-              <a:rPr lang="en-US" i="1" baseline="0" dirty="0" smtClean="0"/>
-              <a:t>inside</a:t>
-            </a:r>
-            <a:r>
-              <a:rPr lang="en-US" i="0" baseline="0" dirty="0" smtClean="0"/>
-              <a:t> that function and find dangerous return values.</a:t>
+              <a:t> the safety in one place. With the first approach, any time the property is used is a potential for a new XSS vulnerability.</a:t>
             </a:r>
             <a:endParaRPr lang="en-US" dirty="0"/>
           </a:p>
@@ -1143,7 +1122,7 @@
           <a:p>
             <a:fld id="{4BE216E4-4DA0-4231-B3A1-A1DCD2E90B1D}" type="slidenum">
               <a:rPr lang="en-US" smtClean="0"/>
-              <a:t>34</a:t>
+              <a:t>29</a:t>
             </a:fld>
             <a:endParaRPr lang="en-US"/>
           </a:p>
@@ -1152,7 +1131,7 @@
     </p:spTree>
     <p:extLst>
       <p:ext uri="{BB962C8B-B14F-4D97-AF65-F5344CB8AC3E}">
-        <p14:creationId xmlns:p14="http://schemas.microsoft.com/office/powerpoint/2010/main" val="2568346829"/>
+        <p14:creationId xmlns:p14="http://schemas.microsoft.com/office/powerpoint/2010/main" val="2294984584"/>
       </p:ext>
     </p:extLst>
   </p:cSld>
@@ -1208,65 +1187,21 @@
           <a:p>
             <a:r>
               <a:rPr lang="en-US" dirty="0" smtClean="0"/>
-              <a:t>But,</a:t>
+              <a:t>Not because</a:t>
             </a:r>
             <a:r>
               <a:rPr lang="en-US" baseline="0" dirty="0" smtClean="0"/>
-              <a:t> realistically, applications just need dynamic SQL sometimes.</a:t>
-            </a:r>
-          </a:p>
-          <a:p>
-            <a:endParaRPr lang="en-US" baseline="0" dirty="0" smtClean="0"/>
-          </a:p>
-          <a:p>
-            <a:pPr marL="0" marR="0" indent="0" algn="l" defTabSz="914400" rtl="0" eaLnBrk="1" fontAlgn="auto" latinLnBrk="0" hangingPunct="1">
-              <a:lnSpc>
-                <a:spcPct val="100000"/>
-              </a:lnSpc>
-              <a:spcBef>
-                <a:spcPts val="0"/>
-              </a:spcBef>
-              <a:spcAft>
-                <a:spcPts val="0"/>
-              </a:spcAft>
-              <a:buClrTx/>
-              <a:buSzTx/>
-              <a:buFontTx/>
-              <a:buNone/>
-              <a:tabLst/>
-              <a:defRPr/>
-            </a:pPr>
+              <a:t> it’s the end of the talk, but because it’s </a:t>
+            </a:r>
+            <a:r>
+              <a:rPr lang="en-US" baseline="0" dirty="0" err="1" smtClean="0"/>
+              <a:t>freakin</a:t>
+            </a:r>
             <a:r>
               <a:rPr lang="en-US" baseline="0" dirty="0" smtClean="0"/>
-              <a:t>Parameters and </a:t>
-            </a:r>
-            <a:r>
-              <a:rPr lang="en-US" baseline="0" dirty="0" err="1" smtClean="0"/>
-              <a:t>enums</a:t>
-            </a:r>
-            <a:r>
-              <a:rPr lang="en-US" baseline="0" dirty="0" smtClean="0"/>
-              <a:t> are easy ones, and pretty foolproof - </a:t>
-            </a:r>
-            <a:r>
-              <a:rPr lang="en-US" baseline="0" dirty="0" smtClean="0"/>
-              <a:t>dynamic SQL </a:t>
-            </a:r>
-            <a:r>
-              <a:rPr lang="en-US" i="1" baseline="0" dirty="0" smtClean="0"/>
-              <a:t>should</a:t>
-            </a:r>
-            <a:r>
-              <a:rPr lang="en-US" i="0" baseline="0" dirty="0" smtClean="0"/>
-              <a:t> really be stuff you couldn’t make as SQL parameters, where the structure of the query changes</a:t>
-            </a:r>
-            <a:endParaRPr lang="en-US" dirty="0" smtClean="0"/>
-          </a:p>
-          <a:p>
-            <a:r>
-              <a:rPr lang="en-US" baseline="0" dirty="0" smtClean="0"/>
-              <a:t>- but it’s really about enforcing that rule and catching it when people slip up.</a:t>
-            </a:r>
+              <a:t>’ hard</a:t>
+            </a:r>
+            <a:endParaRPr lang="en-US" dirty="0"/>
           </a:p>
         </p:txBody>
       </p:sp>
@@ -1287,7 +1222,7 @@
           <a:p>
             <a:fld id="{4BE216E4-4DA0-4231-B3A1-A1DCD2E90B1D}" type="slidenum">
               <a:rPr lang="en-US" smtClean="0"/>
-              <a:t>35</a:t>
+              <a:t>30</a:t>
             </a:fld>
             <a:endParaRPr lang="en-US"/>
           </a:p>
@@ -1296,7 +1231,7 @@
     </p:spTree>
     <p:extLst>
       <p:ext uri="{BB962C8B-B14F-4D97-AF65-F5344CB8AC3E}">
-        <p14:creationId xmlns:p14="http://schemas.microsoft.com/office/powerpoint/2010/main" val="898036015"/>
+        <p14:creationId xmlns:p14="http://schemas.microsoft.com/office/powerpoint/2010/main" val="115033147"/>
       </p:ext>
     </p:extLst>
   </p:cSld>
@@ -1352,59 +1287,45 @@
           <a:p>
             <a:r>
               <a:rPr lang="en-US" dirty="0" smtClean="0"/>
-              <a:t>#1 – </a:t>
-            </a:r>
-            <a:r>
-              <a:rPr lang="en-US" dirty="0" err="1" smtClean="0"/>
-              <a:t>IDisposables</a:t>
-            </a:r>
-            <a:r>
-              <a:rPr lang="en-US" dirty="0" smtClean="0"/>
-              <a:t> are intended to be </a:t>
-            </a:r>
-            <a:r>
-              <a:rPr lang="en-US" i="1" dirty="0" smtClean="0"/>
-              <a:t>disposed</a:t>
+              <a:t>It’s hard to backtrack every variable</a:t>
+            </a:r>
+            <a:r>
+              <a:rPr lang="en-US" baseline="0" dirty="0" smtClean="0"/>
+              <a:t> and make sure it’s coming from clean sources. Often things that are clean are incorrectly marked dirty because the code can’t figure it out.</a:t>
+            </a:r>
+          </a:p>
+          <a:p>
+            <a:endParaRPr lang="en-US" baseline="0" dirty="0" smtClean="0"/>
+          </a:p>
+          <a:p>
+            <a:r>
+              <a:rPr lang="en-US" baseline="0" dirty="0" smtClean="0"/>
+              <a:t>The first one will just tell you it’s untrusted because the parameter is dangerous. Really, what we want in this case is to flag when dangerous things </a:t>
+            </a:r>
+            <a:r>
+              <a:rPr lang="en-US" i="1" baseline="0" dirty="0" smtClean="0"/>
+              <a:t>go into</a:t>
             </a:r>
             <a:r>
               <a:rPr lang="en-US" i="0" baseline="0" dirty="0" smtClean="0"/>
-              <a:t> when you’re done with them, so having a static one is just shady. We had a lot of problems with </a:t>
-            </a:r>
-            <a:r>
-              <a:rPr lang="en-US" i="0" baseline="0" dirty="0" err="1" smtClean="0"/>
-              <a:t>EntityFramework</a:t>
-            </a:r>
+              <a:t> this function.</a:t>
+            </a:r>
+          </a:p>
+          <a:p>
+            <a:endParaRPr lang="en-US" i="0" baseline="0" dirty="0" smtClean="0"/>
+          </a:p>
+          <a:p>
             <a:r>
               <a:rPr lang="en-US" i="0" baseline="0" dirty="0" smtClean="0"/>
-              <a:t> data contexts, and weird issues cropping up in test/production because multiple users/web pages were accessing the same one simultaneously.</a:t>
-            </a:r>
-          </a:p>
-          <a:p>
+              <a:t>The second one will tell you that it’s untrusted from the moment you call the Build function. Really, what you want is to go </a:t>
+            </a:r>
+            <a:r>
+              <a:rPr lang="en-US" i="1" baseline="0" dirty="0" smtClean="0"/>
+              <a:t>inside</a:t>
+            </a:r>
             <a:r>
               <a:rPr lang="en-US" i="0" baseline="0" dirty="0" smtClean="0"/>
-              <a:t>#2 – The </a:t>
-            </a:r>
-            <a:r>
-              <a:rPr lang="en-US" i="0" baseline="0" dirty="0" err="1" smtClean="0"/>
-              <a:t>RelSci</a:t>
-            </a:r>
-            <a:r>
-              <a:rPr lang="en-US" i="0" baseline="0" dirty="0" smtClean="0"/>
-              <a:t> Email library has cool features like checking what environment you’re in and not emailing external addresses outside of production. We totally didn’t think of </a:t>
-            </a:r>
-            <a:r>
-              <a:rPr lang="en-US" i="1" baseline="0" dirty="0" smtClean="0"/>
-              <a:t>that</a:t>
-            </a:r>
-            <a:r>
-              <a:rPr lang="en-US" i="0" baseline="0" dirty="0" smtClean="0"/>
-              <a:t> the hard way.</a:t>
-            </a:r>
-          </a:p>
-          <a:p>
-            <a:r>
-              <a:rPr lang="en-US" i="0" baseline="0" dirty="0" smtClean="0"/>
-              <a:t>#3 – Using a .Context on the data layer could mess up caching – you’re depending on something that’s not going to be part of the cache key.</a:t>
+              <a:t> that function and find dangerous return values.</a:t>
             </a:r>
             <a:endParaRPr lang="en-US" dirty="0"/>
           </a:p>
@@ -1427,7 +1348,7 @@
           <a:p>
             <a:fld id="{4BE216E4-4DA0-4231-B3A1-A1DCD2E90B1D}" type="slidenum">
               <a:rPr lang="en-US" smtClean="0"/>
-              <a:t>37</a:t>
+              <a:t>34</a:t>
             </a:fld>
             <a:endParaRPr lang="en-US"/>
           </a:p>
@@ -1436,7 +1357,7 @@
     </p:spTree>
     <p:extLst>
       <p:ext uri="{BB962C8B-B14F-4D97-AF65-F5344CB8AC3E}">
-        <p14:creationId xmlns:p14="http://schemas.microsoft.com/office/powerpoint/2010/main" val="1694272828"/>
+        <p14:creationId xmlns:p14="http://schemas.microsoft.com/office/powerpoint/2010/main" val="2568346829"/>
       </p:ext>
     </p:extLst>
   </p:cSld>
@@ -1491,26 +1412,62 @@
           <a:lstStyle/>
           <a:p>
             <a:r>
-              <a:rPr lang="en-US" dirty="0" err="1" smtClean="0"/>
-              <a:t>TeamCity</a:t>
-            </a:r>
-            <a:r>
-              <a:rPr lang="en-US" dirty="0" smtClean="0"/>
-              <a:t> has</a:t>
+              <a:rPr lang="en-US" dirty="0" smtClean="0"/>
+              <a:t>But,</a:t>
             </a:r>
             <a:r>
               <a:rPr lang="en-US" baseline="0" dirty="0" smtClean="0"/>
-              <a:t> a built-in option for an </a:t>
+              <a:t> realistically, applications just need dynamic SQL sometimes.</a:t>
+            </a:r>
+          </a:p>
+          <a:p>
+            <a:endParaRPr lang="en-US" baseline="0" dirty="0" smtClean="0"/>
+          </a:p>
+          <a:p>
+            <a:pPr marL="0" marR="0" indent="0" algn="l" defTabSz="914400" rtl="0" eaLnBrk="1" fontAlgn="auto" latinLnBrk="0" hangingPunct="1">
+              <a:lnSpc>
+                <a:spcPct val="100000"/>
+              </a:lnSpc>
+              <a:spcBef>
+                <a:spcPts val="0"/>
+              </a:spcBef>
+              <a:spcAft>
+                <a:spcPts val="0"/>
+              </a:spcAft>
+              <a:buClrTx/>
+              <a:buSzTx/>
+              <a:buFontTx/>
+              <a:buNone/>
+              <a:tabLst/>
+              <a:defRPr/>
+            </a:pPr>
+            <a:r>
+              <a:rPr lang="en-US" baseline="0" dirty="0" smtClean="0"/>
+              <a:t>Parameters and </a:t>
             </a:r>
             <a:r>
               <a:rPr lang="en-US" baseline="0" dirty="0" err="1" smtClean="0"/>
-              <a:t>FxCop</a:t>
+              <a:t>enums</a:t>
             </a:r>
             <a:r>
               <a:rPr lang="en-US" baseline="0" dirty="0" smtClean="0"/>
-              <a:t> build step, other CI systems have it too. Or you can write a script that runs it on the command line.</a:t>
-            </a:r>
-            <a:endParaRPr lang="en-US" dirty="0"/>
+              <a:t> are easy ones, and pretty foolproof - dynamic SQL </a:t>
+            </a:r>
+            <a:r>
+              <a:rPr lang="en-US" i="1" baseline="0" dirty="0" smtClean="0"/>
+              <a:t>should</a:t>
+            </a:r>
+            <a:r>
+              <a:rPr lang="en-US" i="0" baseline="0" dirty="0" smtClean="0"/>
+              <a:t> really be stuff you couldn’t make as SQL parameters, where the structure of the query changes</a:t>
+            </a:r>
+            <a:endParaRPr lang="en-US" dirty="0" smtClean="0"/>
+          </a:p>
+          <a:p>
+            <a:r>
+              <a:rPr lang="en-US" baseline="0" dirty="0" smtClean="0"/>
+              <a:t>- but it’s really about enforcing that rule and catching it when people slip up.</a:t>
+            </a:r>
           </a:p>
         </p:txBody>
       </p:sp>
@@ -1531,7 +1488,7 @@
           <a:p>
             <a:fld id="{4BE216E4-4DA0-4231-B3A1-A1DCD2E90B1D}" type="slidenum">
               <a:rPr lang="en-US" smtClean="0"/>
-              <a:t>39</a:t>
+              <a:t>35</a:t>
             </a:fld>
             <a:endParaRPr lang="en-US"/>
           </a:p>
@@ -1540,7 +1497,7 @@
     </p:spTree>
     <p:extLst>
       <p:ext uri="{BB962C8B-B14F-4D97-AF65-F5344CB8AC3E}">
-        <p14:creationId xmlns:p14="http://schemas.microsoft.com/office/powerpoint/2010/main" val="3861320982"/>
+        <p14:creationId xmlns:p14="http://schemas.microsoft.com/office/powerpoint/2010/main" val="898036015"/>
       </p:ext>
     </p:extLst>
   </p:cSld>
@@ -1594,103 +1551,67 @@
           <a:bodyPr/>
           <a:lstStyle/>
           <a:p>
-            <a:pPr marL="0" marR="0" lvl="2" indent="0" algn="l" defTabSz="914400" rtl="0" eaLnBrk="1" fontAlgn="auto" latinLnBrk="0" hangingPunct="1">
-              <a:lnSpc>
-                <a:spcPct val="100000"/>
-              </a:lnSpc>
-              <a:spcBef>
-                <a:spcPts val="0"/>
-              </a:spcBef>
-              <a:spcAft>
-                <a:spcPts val="0"/>
-              </a:spcAft>
-              <a:buClrTx/>
-              <a:buSzTx/>
-              <a:buFontTx/>
-              <a:buNone/>
-              <a:tabLst/>
-              <a:defRPr/>
-            </a:pPr>
+            <a:r>
+              <a:rPr lang="en-US" dirty="0" smtClean="0"/>
+              <a:t>#1 – </a:t>
+            </a:r>
             <a:r>
               <a:rPr lang="en-US" dirty="0" err="1" smtClean="0"/>
-              <a:t>Html.Raw</a:t>
-            </a:r>
-            <a:r>
-              <a:rPr lang="en-US" dirty="0" smtClean="0"/>
-              <a:t> in .</a:t>
-            </a:r>
-            <a:r>
-              <a:rPr lang="en-US" dirty="0" err="1" smtClean="0"/>
-              <a:t>cshtml</a:t>
-            </a:r>
-            <a:r>
-              <a:rPr lang="en-US" dirty="0" smtClean="0"/>
-              <a:t> files:</a:t>
-            </a:r>
-            <a:r>
-              <a:rPr lang="en-US" baseline="0" dirty="0" smtClean="0"/>
-              <a:t> </a:t>
-            </a:r>
-            <a:r>
-              <a:rPr lang="en-US" dirty="0" smtClean="0"/>
-              <a:t>We can probably still point </a:t>
-            </a:r>
-            <a:r>
-              <a:rPr lang="en-US" dirty="0" err="1" smtClean="0"/>
-              <a:t>FxCop</a:t>
-            </a:r>
-            <a:r>
-              <a:rPr lang="en-US" dirty="0" smtClean="0"/>
-              <a:t> at precompiled assemblies, but will need different rules and standards for those</a:t>
-            </a:r>
-          </a:p>
-          <a:p>
-            <a:pPr marL="0" marR="0" lvl="2" indent="0" algn="l" defTabSz="914400" rtl="0" eaLnBrk="1" fontAlgn="auto" latinLnBrk="0" hangingPunct="1">
-              <a:lnSpc>
-                <a:spcPct val="100000"/>
-              </a:lnSpc>
-              <a:spcBef>
-                <a:spcPts val="0"/>
-              </a:spcBef>
-              <a:spcAft>
-                <a:spcPts val="0"/>
-              </a:spcAft>
-              <a:buClrTx/>
-              <a:buSzTx/>
-              <a:buFontTx/>
-              <a:buNone/>
-              <a:tabLst/>
-              <a:defRPr/>
-            </a:pPr>
-            <a:endParaRPr lang="en-US" dirty="0" smtClean="0"/>
-          </a:p>
-          <a:p>
-            <a:pPr marL="0" marR="0" lvl="2" indent="0" algn="l" defTabSz="914400" rtl="0" eaLnBrk="1" fontAlgn="auto" latinLnBrk="0" hangingPunct="1">
-              <a:lnSpc>
-                <a:spcPct val="100000"/>
-              </a:lnSpc>
-              <a:spcBef>
-                <a:spcPts val="0"/>
-              </a:spcBef>
-              <a:spcAft>
-                <a:spcPts val="0"/>
-              </a:spcAft>
-              <a:buClrTx/>
-              <a:buSzTx/>
-              <a:buFontTx/>
-              <a:buNone/>
-              <a:tabLst/>
-              <a:defRPr/>
-            </a:pPr>
-            <a:r>
-              <a:rPr lang="en-US" dirty="0" smtClean="0"/>
-              <a:t>JavaScript: You should never rely on client-side code for security, but there is potential for static analysis</a:t>
-            </a:r>
-            <a:r>
-              <a:rPr lang="en-US" baseline="0" dirty="0" smtClean="0"/>
-              <a:t> here</a:t>
-            </a:r>
-            <a:endParaRPr lang="en-US" dirty="0" smtClean="0"/>
+              <a:t>IDisposables</a:t>
+            </a:r>
+            <a:r>
+              <a:rPr lang="en-US" dirty="0" smtClean="0"/>
+              <a:t> are intended to be </a:t>
+            </a:r>
+            <a:r>
+              <a:rPr lang="en-US" i="1" dirty="0" smtClean="0"/>
+              <a:t>disposed</a:t>
+            </a:r>
+            <a:r>
+              <a:rPr lang="en-US" i="0" baseline="0" dirty="0" smtClean="0"/>
+              <a:t> when you’re done with them, so having a static one is just shady. We had a lot of problems with </a:t>
+            </a:r>
+            <a:r>
+              <a:rPr lang="en-US" i="0" baseline="0" dirty="0" err="1" smtClean="0"/>
+              <a:t>EntityFramework</a:t>
+            </a:r>
+            <a:r>
+              <a:rPr lang="en-US" i="0" baseline="0" dirty="0" smtClean="0"/>
+              <a:t> data contexts, and weird issues cropping up in test/production because multiple users/web pages were accessing the same one simultaneously.</a:t>
+            </a:r>
+          </a:p>
+          <a:p>
+            <a:r>
+              <a:rPr lang="en-US" i="0" baseline="0" dirty="0" smtClean="0"/>
+              <a:t>#2 – The </a:t>
+            </a:r>
+            <a:r>
+              <a:rPr lang="en-US" i="0" baseline="0" dirty="0" err="1" smtClean="0"/>
+              <a:t>RelSci</a:t>
+            </a:r>
+            <a:r>
+              <a:rPr lang="en-US" i="0" baseline="0" dirty="0" smtClean="0"/>
+              <a:t> Email library has cool features like checking what environment you’re in and not emailing external addresses outside of production. We totally didn’t </a:t>
+            </a:r>
+            <a:r>
+              <a:rPr lang="en-US" i="0" baseline="0" dirty="0" smtClean="0"/>
+              <a:t>come up with </a:t>
+            </a:r>
+            <a:r>
+              <a:rPr lang="en-US" i="1" baseline="0" dirty="0" smtClean="0"/>
+              <a:t>that</a:t>
+            </a:r>
+            <a:r>
+              <a:rPr lang="en-US" i="0" baseline="0" dirty="0" smtClean="0"/>
+              <a:t> the hard way.</a:t>
+            </a:r>
+          </a:p>
+          <a:p>
+            <a:r>
+              <a:rPr lang="en-US" i="0" baseline="0" dirty="0" smtClean="0"/>
+              <a:t>#3 – Using a .Context on the data layer could mess up caching – you’re depending on something that’s not going to be part of the cache key.</a:t>
+            </a:r>
+            <a:endParaRPr lang="en-US" dirty="0"/>
           </a:p>
         </p:txBody>
       </p:sp>
@@ -1711,7 +1632,7 @@
           <a:p>
             <a:fld id="{4BE216E4-4DA0-4231-B3A1-A1DCD2E90B1D}" type="slidenum">
               <a:rPr lang="en-US" smtClean="0"/>
-              <a:t>40</a:t>
+              <a:t>37</a:t>
             </a:fld>
             <a:endParaRPr lang="en-US"/>
           </a:p>
@@ -1720,7 +1641,7 @@
     </p:spTree>
     <p:extLst>
       <p:ext uri="{BB962C8B-B14F-4D97-AF65-F5344CB8AC3E}">
-        <p14:creationId xmlns:p14="http://schemas.microsoft.com/office/powerpoint/2010/main" val="3045863941"/>
+        <p14:creationId xmlns:p14="http://schemas.microsoft.com/office/powerpoint/2010/main" val="1694272828"/>
       </p:ext>
     </p:extLst>
   </p:cSld>
@@ -1776,12 +1697,36 @@
           <a:p>
             <a:r>
               <a:rPr lang="en-US" dirty="0" smtClean="0"/>
-              <a:t>The key point here is</a:t>
-            </a:r>
-            <a:r>
-              <a:rPr lang="en-US" baseline="0" dirty="0" smtClean="0"/>
-              <a:t> that most security tools you think of look at actively running applications, and static analysis happens at an earlier stage, before code has to be deployed at all.</a:t>
-            </a:r>
+              <a:t>.NET: </a:t>
+            </a:r>
+            <a:r>
+              <a:rPr lang="en-US" dirty="0" err="1" smtClean="0"/>
+              <a:t>CodeRush</a:t>
+            </a:r>
+            <a:r>
+              <a:rPr lang="en-US" dirty="0" smtClean="0"/>
+              <a:t>, </a:t>
+            </a:r>
+            <a:r>
+              <a:rPr lang="en-US" dirty="0" err="1" smtClean="0"/>
+              <a:t>Ndepend</a:t>
+            </a:r>
+            <a:r>
+              <a:rPr lang="en-US" dirty="0" smtClean="0"/>
+              <a:t>, </a:t>
+            </a:r>
+            <a:r>
+              <a:rPr lang="en-US" dirty="0" err="1" smtClean="0"/>
+              <a:t>StyleCop</a:t>
+            </a:r>
+            <a:endParaRPr lang="en-US" dirty="0" smtClean="0"/>
+          </a:p>
+          <a:p>
+            <a:r>
+              <a:rPr lang="en-US" dirty="0" err="1" smtClean="0"/>
+              <a:t>JSLint</a:t>
+            </a:r>
+            <a:endParaRPr lang="en-US" dirty="0"/>
           </a:p>
         </p:txBody>
       </p:sp>
@@ -1802,7 +1747,7 @@
           <a:p>
             <a:fld id="{4BE216E4-4DA0-4231-B3A1-A1DCD2E90B1D}" type="slidenum">
               <a:rPr lang="en-US" smtClean="0"/>
-              <a:t>5</a:t>
+              <a:t>4</a:t>
             </a:fld>
             <a:endParaRPr lang="en-US"/>
           </a:p>
@@ -1811,7 +1756,299 @@
     </p:spTree>
     <p:extLst>
       <p:ext uri="{BB962C8B-B14F-4D97-AF65-F5344CB8AC3E}">
-        <p14:creationId xmlns:p14="http://schemas.microsoft.com/office/powerpoint/2010/main" val="2613286858"/>
+        <p14:creationId xmlns:p14="http://schemas.microsoft.com/office/powerpoint/2010/main" val="2421535118"/>
+      </p:ext>
+    </p:extLst>
+  </p:cSld>
+  <p:clrMapOvr>
+    <a:masterClrMapping/>
+  </p:clrMapOvr>
+</p:notes>
+</file>
+
+<file path=ppt/notesSlides/notesSlide20.xml><?xml version="1.0" encoding="utf-8"?>
+<p:notes xmlns:a="http://schemas.openxmlformats.org/drawingml/2006/main" xmlns:r="http://schemas.openxmlformats.org/officeDocument/2006/relationships" xmlns:p="http://schemas.openxmlformats.org/presentationml/2006/main">
+  <p:cSld>
+    <p:spTree>
+      <p:nvGrpSpPr>
+        <p:cNvPr id="1" name=""/>
+        <p:cNvGrpSpPr/>
+        <p:nvPr/>
+      </p:nvGrpSpPr>
+      <p:grpSpPr>
+        <a:xfrm>
+          <a:off x="0" y="0"/>
+          <a:ext cx="0" cy="0"/>
+          <a:chOff x="0" y="0"/>
+          <a:chExt cx="0" cy="0"/>
+        </a:xfrm>
+      </p:grpSpPr>
+      <p:sp>
+        <p:nvSpPr>
+          <p:cNvPr id="2" name="Slide Image Placeholder 1"/>
+          <p:cNvSpPr>
+            <a:spLocks noGrp="1" noRot="1" noChangeAspect="1"/>
+          </p:cNvSpPr>
+          <p:nvPr>
+            <p:ph type="sldImg"/>
+          </p:nvPr>
+        </p:nvSpPr>
+        <p:spPr/>
+      </p:sp>
+      <p:sp>
+        <p:nvSpPr>
+          <p:cNvPr id="3" name="Notes Placeholder 2"/>
+          <p:cNvSpPr>
+            <a:spLocks noGrp="1"/>
+          </p:cNvSpPr>
+          <p:nvPr>
+            <p:ph type="body" idx="1"/>
+          </p:nvPr>
+        </p:nvSpPr>
+        <p:spPr/>
+        <p:txBody>
+          <a:bodyPr/>
+          <a:lstStyle/>
+          <a:p>
+            <a:r>
+              <a:rPr lang="en-US" dirty="0" err="1" smtClean="0"/>
+              <a:t>TeamCity</a:t>
+            </a:r>
+            <a:r>
+              <a:rPr lang="en-US" dirty="0" smtClean="0"/>
+              <a:t> has</a:t>
+            </a:r>
+            <a:r>
+              <a:rPr lang="en-US" baseline="0" dirty="0" smtClean="0"/>
+              <a:t> a built-in option for an </a:t>
+            </a:r>
+            <a:r>
+              <a:rPr lang="en-US" baseline="0" dirty="0" err="1" smtClean="0"/>
+              <a:t>FxCop</a:t>
+            </a:r>
+            <a:r>
+              <a:rPr lang="en-US" baseline="0" dirty="0" smtClean="0"/>
+              <a:t> build step, other CI systems have it too. Or you can write </a:t>
+            </a:r>
+            <a:r>
+              <a:rPr lang="en-US" baseline="0" dirty="0" smtClean="0"/>
+              <a:t>a PowerShell </a:t>
+            </a:r>
+            <a:r>
+              <a:rPr lang="en-US" baseline="0" dirty="0" smtClean="0"/>
+              <a:t>script that runs it on the command line.</a:t>
+            </a:r>
+            <a:endParaRPr lang="en-US" dirty="0"/>
+          </a:p>
+        </p:txBody>
+      </p:sp>
+      <p:sp>
+        <p:nvSpPr>
+          <p:cNvPr id="4" name="Slide Number Placeholder 3"/>
+          <p:cNvSpPr>
+            <a:spLocks noGrp="1"/>
+          </p:cNvSpPr>
+          <p:nvPr>
+            <p:ph type="sldNum" sz="quarter" idx="10"/>
+          </p:nvPr>
+        </p:nvSpPr>
+        <p:spPr/>
+        <p:txBody>
+          <a:bodyPr/>
+          <a:lstStyle/>
+          <a:p>
+            <a:fld id="{4BE216E4-4DA0-4231-B3A1-A1DCD2E90B1D}" type="slidenum">
+              <a:rPr lang="en-US" smtClean="0"/>
+              <a:t>39</a:t>
+            </a:fld>
+            <a:endParaRPr lang="en-US"/>
+          </a:p>
+        </p:txBody>
+      </p:sp>
+    </p:spTree>
+    <p:extLst>
+      <p:ext uri="{BB962C8B-B14F-4D97-AF65-F5344CB8AC3E}">
+        <p14:creationId xmlns:p14="http://schemas.microsoft.com/office/powerpoint/2010/main" val="3861320982"/>
+      </p:ext>
+    </p:extLst>
+  </p:cSld>
+  <p:clrMapOvr>
+    <a:masterClrMapping/>
+  </p:clrMapOvr>
+</p:notes>
+</file>
+
+<file path=ppt/notesSlides/notesSlide21.xml><?xml version="1.0" encoding="utf-8"?>
+<p:notes xmlns:a="http://schemas.openxmlformats.org/drawingml/2006/main" xmlns:r="http://schemas.openxmlformats.org/officeDocument/2006/relationships" xmlns:p="http://schemas.openxmlformats.org/presentationml/2006/main">
+  <p:cSld>
+    <p:spTree>
+      <p:nvGrpSpPr>
+        <p:cNvPr id="1" name=""/>
+        <p:cNvGrpSpPr/>
+        <p:nvPr/>
+      </p:nvGrpSpPr>
+      <p:grpSpPr>
+        <a:xfrm>
+          <a:off x="0" y="0"/>
+          <a:ext cx="0" cy="0"/>
+          <a:chOff x="0" y="0"/>
+          <a:chExt cx="0" cy="0"/>
+        </a:xfrm>
+      </p:grpSpPr>
+      <p:sp>
+        <p:nvSpPr>
+          <p:cNvPr id="2" name="Slide Image Placeholder 1"/>
+          <p:cNvSpPr>
+            <a:spLocks noGrp="1" noRot="1" noChangeAspect="1"/>
+          </p:cNvSpPr>
+          <p:nvPr>
+            <p:ph type="sldImg"/>
+          </p:nvPr>
+        </p:nvSpPr>
+        <p:spPr/>
+      </p:sp>
+      <p:sp>
+        <p:nvSpPr>
+          <p:cNvPr id="3" name="Notes Placeholder 2"/>
+          <p:cNvSpPr>
+            <a:spLocks noGrp="1"/>
+          </p:cNvSpPr>
+          <p:nvPr>
+            <p:ph type="body" idx="1"/>
+          </p:nvPr>
+        </p:nvSpPr>
+        <p:spPr/>
+        <p:txBody>
+          <a:bodyPr/>
+          <a:lstStyle/>
+          <a:p>
+            <a:pPr marL="0" marR="0" lvl="2" indent="0" algn="l" defTabSz="914400" rtl="0" eaLnBrk="1" fontAlgn="auto" latinLnBrk="0" hangingPunct="1">
+              <a:lnSpc>
+                <a:spcPct val="100000"/>
+              </a:lnSpc>
+              <a:spcBef>
+                <a:spcPts val="0"/>
+              </a:spcBef>
+              <a:spcAft>
+                <a:spcPts val="0"/>
+              </a:spcAft>
+              <a:buClrTx/>
+              <a:buSzTx/>
+              <a:buFontTx/>
+              <a:buNone/>
+              <a:tabLst/>
+              <a:defRPr/>
+            </a:pPr>
+            <a:r>
+              <a:rPr lang="en-US" dirty="0" err="1" smtClean="0"/>
+              <a:t>Html.Raw</a:t>
+            </a:r>
+            <a:r>
+              <a:rPr lang="en-US" dirty="0" smtClean="0"/>
+              <a:t> in .</a:t>
+            </a:r>
+            <a:r>
+              <a:rPr lang="en-US" dirty="0" err="1" smtClean="0"/>
+              <a:t>cshtml</a:t>
+            </a:r>
+            <a:r>
+              <a:rPr lang="en-US" dirty="0" smtClean="0"/>
+              <a:t> files:</a:t>
+            </a:r>
+            <a:r>
+              <a:rPr lang="en-US" baseline="0" dirty="0" smtClean="0"/>
+              <a:t> </a:t>
+            </a:r>
+            <a:r>
+              <a:rPr lang="en-US" dirty="0" smtClean="0"/>
+              <a:t>We can probably still point </a:t>
+            </a:r>
+            <a:r>
+              <a:rPr lang="en-US" dirty="0" err="1" smtClean="0"/>
+              <a:t>FxCop</a:t>
+            </a:r>
+            <a:r>
+              <a:rPr lang="en-US" dirty="0" smtClean="0"/>
+              <a:t> at precompiled assemblies, but will need different rules and standards for those</a:t>
+            </a:r>
+          </a:p>
+          <a:p>
+            <a:pPr marL="0" marR="0" lvl="2" indent="0" algn="l" defTabSz="914400" rtl="0" eaLnBrk="1" fontAlgn="auto" latinLnBrk="0" hangingPunct="1">
+              <a:lnSpc>
+                <a:spcPct val="100000"/>
+              </a:lnSpc>
+              <a:spcBef>
+                <a:spcPts val="0"/>
+              </a:spcBef>
+              <a:spcAft>
+                <a:spcPts val="0"/>
+              </a:spcAft>
+              <a:buClrTx/>
+              <a:buSzTx/>
+              <a:buFontTx/>
+              <a:buNone/>
+              <a:tabLst/>
+              <a:defRPr/>
+            </a:pPr>
+            <a:endParaRPr lang="en-US" dirty="0" smtClean="0"/>
+          </a:p>
+          <a:p>
+            <a:pPr marL="0" marR="0" lvl="2" indent="0" algn="l" defTabSz="914400" rtl="0" eaLnBrk="1" fontAlgn="auto" latinLnBrk="0" hangingPunct="1">
+              <a:lnSpc>
+                <a:spcPct val="100000"/>
+              </a:lnSpc>
+              <a:spcBef>
+                <a:spcPts val="0"/>
+              </a:spcBef>
+              <a:spcAft>
+                <a:spcPts val="0"/>
+              </a:spcAft>
+              <a:buClrTx/>
+              <a:buSzTx/>
+              <a:buFontTx/>
+              <a:buNone/>
+              <a:tabLst/>
+              <a:defRPr/>
+            </a:pPr>
+            <a:r>
+              <a:rPr lang="en-US" dirty="0" smtClean="0"/>
+              <a:t>JavaScript: You should never rely on client-side code for security, but there is potential for static analysis</a:t>
+            </a:r>
+            <a:r>
+              <a:rPr lang="en-US" baseline="0" dirty="0" smtClean="0"/>
+              <a:t> here</a:t>
+            </a:r>
+            <a:endParaRPr lang="en-US" dirty="0" smtClean="0"/>
+          </a:p>
+        </p:txBody>
+      </p:sp>
+      <p:sp>
+        <p:nvSpPr>
+          <p:cNvPr id="4" name="Slide Number Placeholder 3"/>
+          <p:cNvSpPr>
+            <a:spLocks noGrp="1"/>
+          </p:cNvSpPr>
+          <p:nvPr>
+            <p:ph type="sldNum" sz="quarter" idx="10"/>
+          </p:nvPr>
+        </p:nvSpPr>
+        <p:spPr/>
+        <p:txBody>
+          <a:bodyPr/>
+          <a:lstStyle/>
+          <a:p>
+            <a:fld id="{4BE216E4-4DA0-4231-B3A1-A1DCD2E90B1D}" type="slidenum">
+              <a:rPr lang="en-US" smtClean="0"/>
+              <a:t>40</a:t>
+            </a:fld>
+            <a:endParaRPr lang="en-US"/>
+          </a:p>
+        </p:txBody>
+      </p:sp>
+    </p:spTree>
+    <p:extLst>
+      <p:ext uri="{BB962C8B-B14F-4D97-AF65-F5344CB8AC3E}">
+        <p14:creationId xmlns:p14="http://schemas.microsoft.com/office/powerpoint/2010/main" val="3045863941"/>
       </p:ext>
     </p:extLst>
   </p:cSld>
@@ -1865,47 +2102,29 @@
           <a:bodyPr/>
           <a:lstStyle/>
           <a:p>
-            <a:pPr marL="0" marR="0" indent="0" algn="l" defTabSz="914400" rtl="0" eaLnBrk="1" fontAlgn="auto" latinLnBrk="0" hangingPunct="1">
-              <a:lnSpc>
-                <a:spcPct val="100000"/>
-              </a:lnSpc>
-              <a:spcBef>
-                <a:spcPts val="0"/>
-              </a:spcBef>
-              <a:spcAft>
-                <a:spcPts val="0"/>
-              </a:spcAft>
-              <a:buClrTx/>
-              <a:buSzTx/>
-              <a:buFontTx/>
-              <a:buNone/>
-              <a:tabLst/>
-              <a:defRPr/>
-            </a:pPr>
-            <a:r>
-              <a:rPr lang="en-US" dirty="0" smtClean="0"/>
-              <a:t>We’re</a:t>
+            <a:r>
+              <a:rPr lang="en-US" dirty="0" smtClean="0"/>
+              <a:t>A compiler is kind of like </a:t>
             </a:r>
             <a:r>
               <a:rPr lang="en-US" baseline="0" dirty="0" smtClean="0"/>
-              <a:t> all familiar with the exponential cost increases to finding a bug later in the lifecycle…</a:t>
+              <a:t>a shitty unit test …</a:t>
             </a:r>
             <a:endParaRPr lang="en-US" dirty="0" smtClean="0"/>
           </a:p>
           <a:p>
             <a:r>
-              <a:rPr lang="en-US" dirty="0" err="1" smtClean="0"/>
-              <a:t>FxCop</a:t>
-            </a:r>
-            <a:r>
-              <a:rPr lang="en-US" dirty="0" smtClean="0"/>
-              <a:t> takes less than</a:t>
+              <a:rPr lang="en-US" dirty="0" smtClean="0"/>
+              <a:t>The </a:t>
+            </a:r>
+            <a:r>
+              <a:rPr lang="en-US" dirty="0" smtClean="0"/>
+              <a:t>key point here is</a:t>
             </a:r>
             <a:r>
               <a:rPr lang="en-US" baseline="0" dirty="0" smtClean="0"/>
-              <a:t> 5 minutes to run on our whole code base. It’s as quick as the compilation.</a:t>
-            </a:r>
-            <a:endParaRPr lang="en-US" dirty="0"/>
+              <a:t> that most security tools you think of look at actively running applications, and static analysis happens at an earlier stage, before code has to be deployed at all.</a:t>
+            </a:r>
           </a:p>
         </p:txBody>
       </p:sp>
@@ -1926,7 +2145,7 @@
           <a:p>
             <a:fld id="{4BE216E4-4DA0-4231-B3A1-A1DCD2E90B1D}" type="slidenum">
               <a:rPr lang="en-US" smtClean="0"/>
-              <a:t>6</a:t>
+              <a:t>5</a:t>
             </a:fld>
             <a:endParaRPr lang="en-US"/>
           </a:p>
@@ -1935,7 +2154,7 @@
     </p:spTree>
     <p:extLst>
       <p:ext uri="{BB962C8B-B14F-4D97-AF65-F5344CB8AC3E}">
-        <p14:creationId xmlns:p14="http://schemas.microsoft.com/office/powerpoint/2010/main" val="3048882384"/>
+        <p14:creationId xmlns:p14="http://schemas.microsoft.com/office/powerpoint/2010/main" val="2613286858"/>
       </p:ext>
     </p:extLst>
   </p:cSld>
@@ -1989,35 +2208,45 @@
           <a:bodyPr/>
           <a:lstStyle/>
           <a:p>
-            <a:r>
-              <a:rPr lang="en-US" dirty="0" smtClean="0"/>
-              <a:t>A trusted site</a:t>
+            <a:pPr marL="0" marR="0" indent="0" algn="l" defTabSz="914400" rtl="0" eaLnBrk="1" fontAlgn="auto" latinLnBrk="0" hangingPunct="1">
+              <a:lnSpc>
+                <a:spcPct val="100000"/>
+              </a:lnSpc>
+              <a:spcBef>
+                <a:spcPts val="0"/>
+              </a:spcBef>
+              <a:spcAft>
+                <a:spcPts val="0"/>
+              </a:spcAft>
+              <a:buClrTx/>
+              <a:buSzTx/>
+              <a:buFontTx/>
+              <a:buNone/>
+              <a:tabLst/>
+              <a:defRPr/>
+            </a:pPr>
+            <a:r>
+              <a:rPr lang="en-US" dirty="0" smtClean="0"/>
+              <a:t>We’re</a:t>
             </a:r>
             <a:r>
               <a:rPr lang="en-US" baseline="0" dirty="0" smtClean="0"/>
-              <a:t> like NYT, </a:t>
-            </a:r>
-            <a:r>
-              <a:rPr lang="en-US" baseline="0" dirty="0" err="1" smtClean="0"/>
-              <a:t>NYPost</a:t>
+              <a:t> all familiar with the exponential cost increases to finding a bug later in the lifecycle…</a:t>
+            </a:r>
+            <a:endParaRPr lang="en-US" dirty="0" smtClean="0"/>
+          </a:p>
+          <a:p>
+            <a:r>
+              <a:rPr lang="en-US" dirty="0" err="1" smtClean="0"/>
+              <a:t>FxCop</a:t>
+            </a:r>
+            <a:r>
+              <a:rPr lang="en-US" dirty="0" smtClean="0"/>
+              <a:t> takes less than</a:t>
             </a:r>
             <a:r>
               <a:rPr lang="en-US" baseline="0" dirty="0" smtClean="0"/>
-              <a:t>, Twitter, </a:t>
-            </a:r>
-            <a:r>
-              <a:rPr lang="en-US" baseline="0" dirty="0" err="1" smtClean="0"/>
-              <a:t>Buzzfeed</a:t>
-            </a:r>
-            <a:r>
-              <a:rPr lang="en-US" baseline="0" dirty="0" smtClean="0"/>
-              <a:t>, whatever else you may read …</a:t>
-            </a:r>
-          </a:p>
-          <a:p>
-            <a:r>
-              <a:rPr lang="en-US" baseline="0" dirty="0" smtClean="0"/>
-              <a:t>And of course, this can be any action you’d take that you’d want to be protected, like changing your email address, transferring money, etc.</a:t>
+              <a:t> 5 minutes to run on our whole code base. It’s as quick as the compilation.</a:t>
             </a:r>
             <a:endParaRPr lang="en-US" dirty="0"/>
           </a:p>
@@ -2040,7 +2269,7 @@
           <a:p>
             <a:fld id="{4BE216E4-4DA0-4231-B3A1-A1DCD2E90B1D}" type="slidenum">
               <a:rPr lang="en-US" smtClean="0"/>
-              <a:t>10</a:t>
+              <a:t>6</a:t>
             </a:fld>
             <a:endParaRPr lang="en-US"/>
           </a:p>
@@ -2049,7 +2278,7 @@
     </p:spTree>
     <p:extLst>
       <p:ext uri="{BB962C8B-B14F-4D97-AF65-F5344CB8AC3E}">
-        <p14:creationId xmlns:p14="http://schemas.microsoft.com/office/powerpoint/2010/main" val="3597823679"/>
+        <p14:creationId xmlns:p14="http://schemas.microsoft.com/office/powerpoint/2010/main" val="3048882384"/>
       </p:ext>
     </p:extLst>
   </p:cSld>
@@ -2105,15 +2334,33 @@
           <a:p>
             <a:r>
               <a:rPr lang="en-US" dirty="0" smtClean="0"/>
-              <a:t>Lots</a:t>
+              <a:t>A trusted site</a:t>
             </a:r>
             <a:r>
               <a:rPr lang="en-US" baseline="0" dirty="0" smtClean="0"/>
-              <a:t> of people that know better than to click a link in an email to chase.stealmymoney.com won’t think twice about a link that says </a:t>
+              <a:t> like NYT, </a:t>
             </a:r>
             <a:r>
               <a:rPr lang="en-US" baseline="0" dirty="0" err="1" smtClean="0"/>
-              <a:t>chase.com?abunchofstuff</a:t>
+              <a:t>NYPost</a:t>
+            </a:r>
+            <a:r>
+              <a:rPr lang="en-US" baseline="0" dirty="0" smtClean="0"/>
+              <a:t>, Twitter, </a:t>
+            </a:r>
+            <a:r>
+              <a:rPr lang="en-US" baseline="0" dirty="0" err="1" smtClean="0"/>
+              <a:t>Buzzfeed</a:t>
+            </a:r>
+            <a:r>
+              <a:rPr lang="en-US" baseline="0" dirty="0" smtClean="0"/>
+              <a:t>, whatever else you may read …</a:t>
+            </a:r>
+          </a:p>
+          <a:p>
+            <a:r>
+              <a:rPr lang="en-US" baseline="0" dirty="0" smtClean="0"/>
+              <a:t>And of course, this can be any action you’d take that you’d want to be protected, like changing your email address, transferring money, etc.</a:t>
             </a:r>
             <a:endParaRPr lang="en-US" dirty="0"/>
           </a:p>
@@ -2136,7 +2383,7 @@
           <a:p>
             <a:fld id="{4BE216E4-4DA0-4231-B3A1-A1DCD2E90B1D}" type="slidenum">
               <a:rPr lang="en-US" smtClean="0"/>
-              <a:t>11</a:t>
+              <a:t>10</a:t>
             </a:fld>
             <a:endParaRPr lang="en-US"/>
           </a:p>
@@ -2145,7 +2392,7 @@
     </p:spTree>
     <p:extLst>
       <p:ext uri="{BB962C8B-B14F-4D97-AF65-F5344CB8AC3E}">
-        <p14:creationId xmlns:p14="http://schemas.microsoft.com/office/powerpoint/2010/main" val="2074826441"/>
+        <p14:creationId xmlns:p14="http://schemas.microsoft.com/office/powerpoint/2010/main" val="3597823679"/>
       </p:ext>
     </p:extLst>
   </p:cSld>
@@ -2199,32 +2446,19 @@
           <a:bodyPr/>
           <a:lstStyle/>
           <a:p>
-            <a:pPr marL="0" marR="0" indent="0" algn="l" defTabSz="914400" rtl="0" eaLnBrk="1" fontAlgn="auto" latinLnBrk="0" hangingPunct="1">
-              <a:lnSpc>
-                <a:spcPct val="100000"/>
-              </a:lnSpc>
-              <a:spcBef>
-                <a:spcPts val="0"/>
-              </a:spcBef>
-              <a:spcAft>
-                <a:spcPts val="0"/>
-              </a:spcAft>
-              <a:buClrTx/>
-              <a:buSzTx/>
-              <a:buFontTx/>
-              <a:buNone/>
-              <a:tabLst/>
-              <a:defRPr/>
-            </a:pPr>
-            <a:r>
-              <a:rPr lang="en-US" dirty="0" smtClean="0"/>
-              <a:t>All your</a:t>
+            <a:r>
+              <a:rPr lang="en-US" dirty="0" smtClean="0"/>
+              <a:t>Lots</a:t>
             </a:r>
             <a:r>
               <a:rPr lang="en-US" baseline="0" dirty="0" smtClean="0"/>
-              <a:t> tokens, same-origin policies, URL referrer checks, etc. can’t protect you from this …</a:t>
-            </a:r>
-            <a:endParaRPr lang="en-US" dirty="0" smtClean="0"/>
+              <a:t> of people that know better than to click a link in an email to chase.stealmymoney.com won’t think twice about a link that says </a:t>
+            </a:r>
+            <a:r>
+              <a:rPr lang="en-US" baseline="0" dirty="0" err="1" smtClean="0"/>
+              <a:t>chase.com?abunchofstuff</a:t>
+            </a:r>
+            <a:endParaRPr lang="en-US" dirty="0"/>
           </a:p>
         </p:txBody>
       </p:sp>
@@ -2245,7 +2479,7 @@
           <a:p>
             <a:fld id="{4BE216E4-4DA0-4231-B3A1-A1DCD2E90B1D}" type="slidenum">
               <a:rPr lang="en-US" smtClean="0"/>
-              <a:t>15</a:t>
+              <a:t>11</a:t>
             </a:fld>
             <a:endParaRPr lang="en-US"/>
           </a:p>
@@ -2254,7 +2488,7 @@
     </p:spTree>
     <p:extLst>
       <p:ext uri="{BB962C8B-B14F-4D97-AF65-F5344CB8AC3E}">
-        <p14:creationId xmlns:p14="http://schemas.microsoft.com/office/powerpoint/2010/main" val="3382191111"/>
+        <p14:creationId xmlns:p14="http://schemas.microsoft.com/office/powerpoint/2010/main" val="2074826441"/>
       </p:ext>
     </p:extLst>
   </p:cSld>
@@ -2308,7 +2542,32 @@
           <a:bodyPr/>
           <a:lstStyle/>
           <a:p>
-            <a:endParaRPr lang="en-US" dirty="0"/>
+            <a:pPr marL="0" marR="0" indent="0" algn="l" defTabSz="914400" rtl="0" eaLnBrk="1" fontAlgn="auto" latinLnBrk="0" hangingPunct="1">
+              <a:lnSpc>
+                <a:spcPct val="100000"/>
+              </a:lnSpc>
+              <a:spcBef>
+                <a:spcPts val="0"/>
+              </a:spcBef>
+              <a:spcAft>
+                <a:spcPts val="0"/>
+              </a:spcAft>
+              <a:buClrTx/>
+              <a:buSzTx/>
+              <a:buFontTx/>
+              <a:buNone/>
+              <a:tabLst/>
+              <a:defRPr/>
+            </a:pPr>
+            <a:r>
+              <a:rPr lang="en-US" dirty="0" smtClean="0"/>
+              <a:t>All your</a:t>
+            </a:r>
+            <a:r>
+              <a:rPr lang="en-US" baseline="0" dirty="0" smtClean="0"/>
+              <a:t> tokens, same-origin policies, URL referrer checks, etc. can’t protect you from this …</a:t>
+            </a:r>
+            <a:endParaRPr lang="en-US" dirty="0" smtClean="0"/>
           </a:p>
         </p:txBody>
       </p:sp>
@@ -2329,7 +2588,7 @@
           <a:p>
             <a:fld id="{4BE216E4-4DA0-4231-B3A1-A1DCD2E90B1D}" type="slidenum">
               <a:rPr lang="en-US" smtClean="0"/>
-              <a:t>16</a:t>
+              <a:t>15</a:t>
             </a:fld>
             <a:endParaRPr lang="en-US"/>
           </a:p>
@@ -2338,7 +2597,7 @@
     </p:spTree>
     <p:extLst>
       <p:ext uri="{BB962C8B-B14F-4D97-AF65-F5344CB8AC3E}">
-        <p14:creationId xmlns:p14="http://schemas.microsoft.com/office/powerpoint/2010/main" val="2816046996"/>
+        <p14:creationId xmlns:p14="http://schemas.microsoft.com/office/powerpoint/2010/main" val="3382191111"/>
       </p:ext>
     </p:extLst>
   </p:cSld>
@@ -2392,18 +2651,6 @@
           <a:bodyPr/>
           <a:lstStyle/>
           <a:p>
-            <a:r>
-              <a:rPr lang="en-US" dirty="0" smtClean="0"/>
-              <a:t>There’s a good blog post, it’s also the first Google</a:t>
-            </a:r>
-            <a:r>
-              <a:rPr lang="en-US" baseline="0" dirty="0" smtClean="0"/>
-              <a:t> result</a:t>
-            </a:r>
-            <a:r>
-              <a:rPr lang="en-US" dirty="0" smtClean="0"/>
-              <a:t>, I’m not going to go into the details, it’s similar to CSRF.</a:t>
-            </a:r>
             <a:endParaRPr lang="en-US" dirty="0"/>
           </a:p>
         </p:txBody>
@@ -2425,7 +2672,7 @@
           <a:p>
             <a:fld id="{4BE216E4-4DA0-4231-B3A1-A1DCD2E90B1D}" type="slidenum">
               <a:rPr lang="en-US" smtClean="0"/>
-              <a:t>21</a:t>
+              <a:t>16</a:t>
             </a:fld>
             <a:endParaRPr lang="en-US"/>
           </a:p>
@@ -2434,7 +2681,7 @@
     </p:spTree>
     <p:extLst>
       <p:ext uri="{BB962C8B-B14F-4D97-AF65-F5344CB8AC3E}">
-        <p14:creationId xmlns:p14="http://schemas.microsoft.com/office/powerpoint/2010/main" val="3960962458"/>
+        <p14:creationId xmlns:p14="http://schemas.microsoft.com/office/powerpoint/2010/main" val="2816046996"/>
       </p:ext>
     </p:extLst>
   </p:cSld>
@@ -2490,11 +2737,15 @@
           <a:p>
             <a:r>
               <a:rPr lang="en-US" dirty="0" smtClean="0"/>
-              <a:t>It’s a great example because the code is small enough to fit on a PowerPoint</a:t>
+              <a:t>There’s a good blog post, it’s also the first Google</a:t>
             </a:r>
             <a:r>
               <a:rPr lang="en-US" baseline="0" dirty="0" smtClean="0"/>
-              <a:t> slide.</a:t>
+              <a:t> result</a:t>
+            </a:r>
+            <a:r>
+              <a:rPr lang="en-US" dirty="0" smtClean="0"/>
+              <a:t>, I’m not going to go into the details, it’s similar to CSRF.</a:t>
             </a:r>
             <a:endParaRPr lang="en-US" dirty="0"/>
           </a:p>
@@ -2517,7 +2768,7 @@
           <a:p>
             <a:fld id="{4BE216E4-4DA0-4231-B3A1-A1DCD2E90B1D}" type="slidenum">
               <a:rPr lang="en-US" smtClean="0"/>
-              <a:t>22</a:t>
+              <a:t>21</a:t>
             </a:fld>
             <a:endParaRPr lang="en-US"/>
           </a:p>
@@ -2526,7 +2777,7 @@
     </p:spTree>
     <p:extLst>
       <p:ext uri="{BB962C8B-B14F-4D97-AF65-F5344CB8AC3E}">
-        <p14:creationId xmlns:p14="http://schemas.microsoft.com/office/powerpoint/2010/main" val="541026763"/>
+        <p14:creationId xmlns:p14="http://schemas.microsoft.com/office/powerpoint/2010/main" val="3960962458"/>
       </p:ext>
     </p:extLst>
   </p:cSld>
@@ -2718,7 +2969,7 @@
             <a:fld id="{1D8BD707-D9CF-40AE-B4C6-C98DA3205C09}" type="datetimeFigureOut">
               <a:rPr lang="en-US" smtClean="0"/>
               <a:pPr/>
-              <a:t>11/27/2013</a:t>
+              <a:t>12/4/2013</a:t>
             </a:fld>
             <a:endParaRPr lang="en-US"/>
           </a:p>
@@ -2767,11 +3018,82 @@
           </a:p>
         </p:txBody>
       </p:sp>
+      <p:pic>
+        <p:nvPicPr>
+          <p:cNvPr id="7" name="Picture 2"/>
+          <p:cNvPicPr>
+            <a:picLocks noChangeAspect="1" noChangeArrowheads="1"/>
+          </p:cNvPicPr>
+          <p:nvPr userDrawn="1"/>
+        </p:nvPicPr>
+        <p:blipFill>
+          <a:blip r:embed="rId2" cstate="print">
+            <a:extLst>
+              <a:ext uri="{28A0092B-C50C-407E-A947-70E740481C1C}">
+                <a14:useLocalDpi xmlns:a14="http://schemas.microsoft.com/office/drawing/2010/main" val="0"/>
+              </a:ext>
+            </a:extLst>
+          </a:blip>
+          <a:srcRect/>
+          <a:stretch>
+            <a:fillRect/>
+          </a:stretch>
+        </p:blipFill>
+        <p:spPr bwMode="auto">
+          <a:xfrm>
+            <a:off x="6858000" y="6096000"/>
+            <a:ext cx="2286000" cy="762000"/>
+          </a:xfrm>
+          <a:prstGeom prst="rect">
+            <a:avLst/>
+          </a:prstGeom>
+          <a:noFill/>
+          <a:ln>
+            <a:noFill/>
+          </a:ln>
+          <a:effectLst/>
+          <a:extLst>
+            <a:ext uri="{909E8E84-426E-40DD-AFC4-6F175D3DCCD1}">
+              <a14:hiddenFill xmlns:a14="http://schemas.microsoft.com/office/drawing/2010/main">
+                <a:solidFill>
+                  <a:schemeClr val="accent1"/>
+                </a:solidFill>
+              </a14:hiddenFill>
+            </a:ext>
+            <a:ext uri="{91240B29-F687-4F45-9708-019B960494DF}">
+              <a14:hiddenLine xmlns:a14="http://schemas.microsoft.com/office/drawing/2010/main" w="9525">
+                <a:solidFill>
+                  <a:schemeClr val="tx1"/>
+                </a:solidFill>
+                <a:miter lim="800000"/>
+                <a:headEnd/>
+                <a:tailEnd/>
+              </a14:hiddenLine>
+            </a:ext>
+            <a:ext uri="{AF507438-7753-43E0-B8FC-AC1667EBCBE1}">
+              <a14:hiddenEffects xmlns:a14="http://schemas.microsoft.com/office/drawing/2010/main">
+                <a:effectLst>
+                  <a:outerShdw dist="35921" dir="2700000" algn="ctr" rotWithShape="0">
+                    <a:schemeClr val="bg2"/>
+                  </a:outerShdw>
+                </a:effectLst>
+              </a14:hiddenEffects>
+            </a:ext>
+          </a:extLst>
+        </p:spPr>
+      </p:pic>
     </p:spTree>
   </p:cSld>
   <p:clrMapOvr>
     <a:masterClrMapping/>
   </p:clrMapOvr>
+  <p:timing>
+    <p:tnLst>
+      <p:par>
+        <p:cTn id="1" dur="indefinite" restart="never" nodeType="tmRoot"/>
+      </p:par>
+    </p:tnLst>
+  </p:timing>
 </p:sldLayout>
 </file>
 
@@ -2885,7 +3207,7 @@
             <a:fld id="{1D8BD707-D9CF-40AE-B4C6-C98DA3205C09}" type="datetimeFigureOut">
               <a:rPr lang="en-US" smtClean="0"/>
               <a:pPr/>
-              <a:t>11/27/2013</a:t>
+              <a:t>12/4/2013</a:t>
             </a:fld>
             <a:endParaRPr lang="en-US"/>
           </a:p>
@@ -2934,11 +3256,82 @@
           </a:p>
         </p:txBody>
       </p:sp>
+      <p:pic>
+        <p:nvPicPr>
+          <p:cNvPr id="7" name="Picture 2"/>
+          <p:cNvPicPr>
+            <a:picLocks noChangeAspect="1" noChangeArrowheads="1"/>
+          </p:cNvPicPr>
+          <p:nvPr userDrawn="1"/>
+        </p:nvPicPr>
+        <p:blipFill>
+          <a:blip r:embed="rId2" cstate="print">
+            <a:extLst>
+              <a:ext uri="{28A0092B-C50C-407E-A947-70E740481C1C}">
+                <a14:useLocalDpi xmlns:a14="http://schemas.microsoft.com/office/drawing/2010/main" val="0"/>
+              </a:ext>
+            </a:extLst>
+          </a:blip>
+          <a:srcRect/>
+          <a:stretch>
+            <a:fillRect/>
+          </a:stretch>
+        </p:blipFill>
+        <p:spPr bwMode="auto">
+          <a:xfrm>
+            <a:off x="6858000" y="6096000"/>
+            <a:ext cx="2286000" cy="762000"/>
+          </a:xfrm>
+          <a:prstGeom prst="rect">
+            <a:avLst/>
+          </a:prstGeom>
+          <a:noFill/>
+          <a:ln>
+            <a:noFill/>
+          </a:ln>
+          <a:effectLst/>
+          <a:extLst>
+            <a:ext uri="{909E8E84-426E-40DD-AFC4-6F175D3DCCD1}">
+              <a14:hiddenFill xmlns:a14="http://schemas.microsoft.com/office/drawing/2010/main">
+                <a:solidFill>
+                  <a:schemeClr val="accent1"/>
+                </a:solidFill>
+              </a14:hiddenFill>
+            </a:ext>
+            <a:ext uri="{91240B29-F687-4F45-9708-019B960494DF}">
+              <a14:hiddenLine xmlns:a14="http://schemas.microsoft.com/office/drawing/2010/main" w="9525">
+                <a:solidFill>
+                  <a:schemeClr val="tx1"/>
+                </a:solidFill>
+                <a:miter lim="800000"/>
+                <a:headEnd/>
+                <a:tailEnd/>
+              </a14:hiddenLine>
+            </a:ext>
+            <a:ext uri="{AF507438-7753-43E0-B8FC-AC1667EBCBE1}">
+              <a14:hiddenEffects xmlns:a14="http://schemas.microsoft.com/office/drawing/2010/main">
+                <a:effectLst>
+                  <a:outerShdw dist="35921" dir="2700000" algn="ctr" rotWithShape="0">
+                    <a:schemeClr val="bg2"/>
+                  </a:outerShdw>
+                </a:effectLst>
+              </a14:hiddenEffects>
+            </a:ext>
+          </a:extLst>
+        </p:spPr>
+      </p:pic>
     </p:spTree>
   </p:cSld>
   <p:clrMapOvr>
     <a:masterClrMapping/>
   </p:clrMapOvr>
+  <p:timing>
+    <p:tnLst>
+      <p:par>
+        <p:cTn id="1" dur="indefinite" restart="never" nodeType="tmRoot"/>
+      </p:par>
+    </p:tnLst>
+  </p:timing>
 </p:sldLayout>
 </file>
 
@@ -3062,7 +3455,7 @@
             <a:fld id="{1D8BD707-D9CF-40AE-B4C6-C98DA3205C09}" type="datetimeFigureOut">
               <a:rPr lang="en-US" smtClean="0"/>
               <a:pPr/>
-              <a:t>11/27/2013</a:t>
+              <a:t>12/4/2013</a:t>
             </a:fld>
             <a:endParaRPr lang="en-US"/>
           </a:p>
@@ -3111,11 +3504,82 @@
           </a:p>
         </p:txBody>
       </p:sp>
+      <p:pic>
+        <p:nvPicPr>
+          <p:cNvPr id="7" name="Picture 2"/>
+          <p:cNvPicPr>
+            <a:picLocks noChangeAspect="1" noChangeArrowheads="1"/>
+          </p:cNvPicPr>
+          <p:nvPr userDrawn="1"/>
+        </p:nvPicPr>
+        <p:blipFill>
+          <a:blip r:embed="rId2" cstate="print">
+            <a:extLst>
+              <a:ext uri="{28A0092B-C50C-407E-A947-70E740481C1C}">
+                <a14:useLocalDpi xmlns:a14="http://schemas.microsoft.com/office/drawing/2010/main" val="0"/>
+              </a:ext>
+            </a:extLst>
+          </a:blip>
+          <a:srcRect/>
+          <a:stretch>
+            <a:fillRect/>
+          </a:stretch>
+        </p:blipFill>
+        <p:spPr bwMode="auto">
+          <a:xfrm>
+            <a:off x="6858000" y="6096000"/>
+            <a:ext cx="2286000" cy="762000"/>
+          </a:xfrm>
+          <a:prstGeom prst="rect">
+            <a:avLst/>
+          </a:prstGeom>
+          <a:noFill/>
+          <a:ln>
+            <a:noFill/>
+          </a:ln>
+          <a:effectLst/>
+          <a:extLst>
+            <a:ext uri="{909E8E84-426E-40DD-AFC4-6F175D3DCCD1}">
+              <a14:hiddenFill xmlns:a14="http://schemas.microsoft.com/office/drawing/2010/main">
+                <a:solidFill>
+                  <a:schemeClr val="accent1"/>
+                </a:solidFill>
+              </a14:hiddenFill>
+            </a:ext>
+            <a:ext uri="{91240B29-F687-4F45-9708-019B960494DF}">
+              <a14:hiddenLine xmlns:a14="http://schemas.microsoft.com/office/drawing/2010/main" w="9525">
+                <a:solidFill>
+                  <a:schemeClr val="tx1"/>
+                </a:solidFill>
+                <a:miter lim="800000"/>
+                <a:headEnd/>
+                <a:tailEnd/>
+              </a14:hiddenLine>
+            </a:ext>
+            <a:ext uri="{AF507438-7753-43E0-B8FC-AC1667EBCBE1}">
+              <a14:hiddenEffects xmlns:a14="http://schemas.microsoft.com/office/drawing/2010/main">
+                <a:effectLst>
+                  <a:outerShdw dist="35921" dir="2700000" algn="ctr" rotWithShape="0">
+                    <a:schemeClr val="bg2"/>
+                  </a:outerShdw>
+                </a:effectLst>
+              </a14:hiddenEffects>
+            </a:ext>
+          </a:extLst>
+        </p:spPr>
+      </p:pic>
     </p:spTree>
   </p:cSld>
   <p:clrMapOvr>
     <a:masterClrMapping/>
   </p:clrMapOvr>
+  <p:timing>
+    <p:tnLst>
+      <p:par>
+        <p:cTn id="1" dur="indefinite" restart="never" nodeType="tmRoot"/>
+      </p:par>
+    </p:tnLst>
+  </p:timing>
 </p:sldLayout>
 </file>
 
@@ -3229,7 +3693,7 @@
             <a:fld id="{1D8BD707-D9CF-40AE-B4C6-C98DA3205C09}" type="datetimeFigureOut">
               <a:rPr lang="en-US" smtClean="0"/>
               <a:pPr/>
-              <a:t>11/27/2013</a:t>
+              <a:t>12/4/2013</a:t>
             </a:fld>
             <a:endParaRPr lang="en-US"/>
           </a:p>
@@ -3278,11 +3742,82 @@
           </a:p>
         </p:txBody>
       </p:sp>
+      <p:pic>
+        <p:nvPicPr>
+          <p:cNvPr id="7" name="Picture 2"/>
+          <p:cNvPicPr>
+            <a:picLocks noChangeAspect="1" noChangeArrowheads="1"/>
+          </p:cNvPicPr>
+          <p:nvPr userDrawn="1"/>
+        </p:nvPicPr>
+        <p:blipFill>
+          <a:blip r:embed="rId2" cstate="print">
+            <a:extLst>
+              <a:ext uri="{28A0092B-C50C-407E-A947-70E740481C1C}">
+                <a14:useLocalDpi xmlns:a14="http://schemas.microsoft.com/office/drawing/2010/main" val="0"/>
+              </a:ext>
+            </a:extLst>
+          </a:blip>
+          <a:srcRect/>
+          <a:stretch>
+            <a:fillRect/>
+          </a:stretch>
+        </p:blipFill>
+        <p:spPr bwMode="auto">
+          <a:xfrm>
+            <a:off x="6858000" y="6096000"/>
+            <a:ext cx="2286000" cy="762000"/>
+          </a:xfrm>
+          <a:prstGeom prst="rect">
+            <a:avLst/>
+          </a:prstGeom>
+          <a:noFill/>
+          <a:ln>
+            <a:noFill/>
+          </a:ln>
+          <a:effectLst/>
+          <a:extLst>
+            <a:ext uri="{909E8E84-426E-40DD-AFC4-6F175D3DCCD1}">
+              <a14:hiddenFill xmlns:a14="http://schemas.microsoft.com/office/drawing/2010/main">
+                <a:solidFill>
+                  <a:schemeClr val="accent1"/>
+                </a:solidFill>
+              </a14:hiddenFill>
+            </a:ext>
+            <a:ext uri="{91240B29-F687-4F45-9708-019B960494DF}">
+              <a14:hiddenLine xmlns:a14="http://schemas.microsoft.com/office/drawing/2010/main" w="9525">
+                <a:solidFill>
+                  <a:schemeClr val="tx1"/>
+                </a:solidFill>
+                <a:miter lim="800000"/>
+                <a:headEnd/>
+                <a:tailEnd/>
+              </a14:hiddenLine>
+            </a:ext>
+            <a:ext uri="{AF507438-7753-43E0-B8FC-AC1667EBCBE1}">
+              <a14:hiddenEffects xmlns:a14="http://schemas.microsoft.com/office/drawing/2010/main">
+                <a:effectLst>
+                  <a:outerShdw dist="35921" dir="2700000" algn="ctr" rotWithShape="0">
+                    <a:schemeClr val="bg2"/>
+                  </a:outerShdw>
+                </a:effectLst>
+              </a14:hiddenEffects>
+            </a:ext>
+          </a:extLst>
+        </p:spPr>
+      </p:pic>
     </p:spTree>
   </p:cSld>
   <p:clrMapOvr>
     <a:masterClrMapping/>
   </p:clrMapOvr>
+  <p:timing>
+    <p:tnLst>
+      <p:par>
+        <p:cTn id="1" dur="indefinite" restart="never" nodeType="tmRoot"/>
+      </p:par>
+    </p:tnLst>
+  </p:timing>
 </p:sldLayout>
 </file>
 
@@ -3472,7 +4007,7 @@
             <a:fld id="{1D8BD707-D9CF-40AE-B4C6-C98DA3205C09}" type="datetimeFigureOut">
               <a:rPr lang="en-US" smtClean="0"/>
               <a:pPr/>
-              <a:t>11/27/2013</a:t>
+              <a:t>12/4/2013</a:t>
             </a:fld>
             <a:endParaRPr lang="en-US"/>
           </a:p>
@@ -3521,11 +4056,82 @@
           </a:p>
         </p:txBody>
       </p:sp>
+      <p:pic>
+        <p:nvPicPr>
+          <p:cNvPr id="7" name="Picture 2"/>
+          <p:cNvPicPr>
+            <a:picLocks noChangeAspect="1" noChangeArrowheads="1"/>
+          </p:cNvPicPr>
+          <p:nvPr userDrawn="1"/>
+        </p:nvPicPr>
+        <p:blipFill>
+          <a:blip r:embed="rId2" cstate="print">
+            <a:extLst>
+              <a:ext uri="{28A0092B-C50C-407E-A947-70E740481C1C}">
+                <a14:useLocalDpi xmlns:a14="http://schemas.microsoft.com/office/drawing/2010/main" val="0"/>
+              </a:ext>
+            </a:extLst>
+          </a:blip>
+          <a:srcRect/>
+          <a:stretch>
+            <a:fillRect/>
+          </a:stretch>
+        </p:blipFill>
+        <p:spPr bwMode="auto">
+          <a:xfrm>
+            <a:off x="6858000" y="6096000"/>
+            <a:ext cx="2286000" cy="762000"/>
+          </a:xfrm>
+          <a:prstGeom prst="rect">
+            <a:avLst/>
+          </a:prstGeom>
+          <a:noFill/>
+          <a:ln>
+            <a:noFill/>
+          </a:ln>
+          <a:effectLst/>
+          <a:extLst>
+            <a:ext uri="{909E8E84-426E-40DD-AFC4-6F175D3DCCD1}">
+              <a14:hiddenFill xmlns:a14="http://schemas.microsoft.com/office/drawing/2010/main">
+                <a:solidFill>
+                  <a:schemeClr val="accent1"/>
+                </a:solidFill>
+              </a14:hiddenFill>
+            </a:ext>
+            <a:ext uri="{91240B29-F687-4F45-9708-019B960494DF}">
+              <a14:hiddenLine xmlns:a14="http://schemas.microsoft.com/office/drawing/2010/main" w="9525">
+                <a:solidFill>
+                  <a:schemeClr val="tx1"/>
+                </a:solidFill>
+                <a:miter lim="800000"/>
+                <a:headEnd/>
+                <a:tailEnd/>
+              </a14:hiddenLine>
+            </a:ext>
+            <a:ext uri="{AF507438-7753-43E0-B8FC-AC1667EBCBE1}">
+              <a14:hiddenEffects xmlns:a14="http://schemas.microsoft.com/office/drawing/2010/main">
+                <a:effectLst>
+                  <a:outerShdw dist="35921" dir="2700000" algn="ctr" rotWithShape="0">
+                    <a:schemeClr val="bg2"/>
+                  </a:outerShdw>
+                </a:effectLst>
+              </a14:hiddenEffects>
+            </a:ext>
+          </a:extLst>
+        </p:spPr>
+      </p:pic>
     </p:spTree>
   </p:cSld>
   <p:clrMapOvr>
     <a:masterClrMapping/>
   </p:clrMapOvr>
+  <p:timing>
+    <p:tnLst>
+      <p:par>
+        <p:cTn id="1" dur="indefinite" restart="never" nodeType="tmRoot"/>
+      </p:par>
+    </p:tnLst>
+  </p:timing>
 </p:sldLayout>
 </file>
 
@@ -3757,7 +4363,7 @@
             <a:fld id="{1D8BD707-D9CF-40AE-B4C6-C98DA3205C09}" type="datetimeFigureOut">
               <a:rPr lang="en-US" smtClean="0"/>
               <a:pPr/>
-              <a:t>11/27/2013</a:t>
+              <a:t>12/4/2013</a:t>
             </a:fld>
             <a:endParaRPr lang="en-US"/>
           </a:p>
@@ -3806,11 +4412,82 @@
           </a:p>
         </p:txBody>
       </p:sp>
+      <p:pic>
+        <p:nvPicPr>
+          <p:cNvPr id="8" name="Picture 2"/>
+          <p:cNvPicPr>
+            <a:picLocks noChangeAspect="1" noChangeArrowheads="1"/>
+          </p:cNvPicPr>
+          <p:nvPr userDrawn="1"/>
+        </p:nvPicPr>
+        <p:blipFill>
+          <a:blip r:embed="rId2" cstate="print">
+            <a:extLst>
+              <a:ext uri="{28A0092B-C50C-407E-A947-70E740481C1C}">
+                <a14:useLocalDpi xmlns:a14="http://schemas.microsoft.com/office/drawing/2010/main" val="0"/>
+              </a:ext>
+            </a:extLst>
+          </a:blip>
+          <a:srcRect/>
+          <a:stretch>
+            <a:fillRect/>
+          </a:stretch>
+        </p:blipFill>
+        <p:spPr bwMode="auto">
+          <a:xfrm>
+            <a:off x="6858000" y="6096000"/>
+            <a:ext cx="2286000" cy="762000"/>
+          </a:xfrm>
+          <a:prstGeom prst="rect">
+            <a:avLst/>
+          </a:prstGeom>
+          <a:noFill/>
+          <a:ln>
+            <a:noFill/>
+          </a:ln>
+          <a:effectLst/>
+          <a:extLst>
+            <a:ext uri="{909E8E84-426E-40DD-AFC4-6F175D3DCCD1}">
+              <a14:hiddenFill xmlns:a14="http://schemas.microsoft.com/office/drawing/2010/main">
+                <a:solidFill>
+                  <a:schemeClr val="accent1"/>
+                </a:solidFill>
+              </a14:hiddenFill>
+            </a:ext>
+            <a:ext uri="{91240B29-F687-4F45-9708-019B960494DF}">
+              <a14:hiddenLine xmlns:a14="http://schemas.microsoft.com/office/drawing/2010/main" w="9525">
+                <a:solidFill>
+                  <a:schemeClr val="tx1"/>
+                </a:solidFill>
+                <a:miter lim="800000"/>
+                <a:headEnd/>
+                <a:tailEnd/>
+              </a14:hiddenLine>
+            </a:ext>
+            <a:ext uri="{AF507438-7753-43E0-B8FC-AC1667EBCBE1}">
+              <a14:hiddenEffects xmlns:a14="http://schemas.microsoft.com/office/drawing/2010/main">
+                <a:effectLst>
+                  <a:outerShdw dist="35921" dir="2700000" algn="ctr" rotWithShape="0">
+                    <a:schemeClr val="bg2"/>
+                  </a:outerShdw>
+                </a:effectLst>
+              </a14:hiddenEffects>
+            </a:ext>
+          </a:extLst>
+        </p:spPr>
+      </p:pic>
     </p:spTree>
   </p:cSld>
   <p:clrMapOvr>
     <a:masterClrMapping/>
   </p:clrMapOvr>
+  <p:timing>
+    <p:tnLst>
+      <p:par>
+        <p:cTn id="1" dur="indefinite" restart="never" nodeType="tmRoot"/>
+      </p:par>
+    </p:tnLst>
+  </p:timing>
 </p:sldLayout>
 </file>
 
@@ -4176,7 +4853,7 @@
             <a:fld id="{1D8BD707-D9CF-40AE-B4C6-C98DA3205C09}" type="datetimeFigureOut">
               <a:rPr lang="en-US" smtClean="0"/>
               <a:pPr/>
-              <a:t>11/27/2013</a:t>
+              <a:t>12/4/2013</a:t>
             </a:fld>
             <a:endParaRPr lang="en-US"/>
           </a:p>
@@ -4225,11 +4902,82 @@
           </a:p>
         </p:txBody>
       </p:sp>
+      <p:pic>
+        <p:nvPicPr>
+          <p:cNvPr id="10" name="Picture 2"/>
+          <p:cNvPicPr>
+            <a:picLocks noChangeAspect="1" noChangeArrowheads="1"/>
+          </p:cNvPicPr>
+          <p:nvPr userDrawn="1"/>
+        </p:nvPicPr>
+        <p:blipFill>
+          <a:blip r:embed="rId2" cstate="print">
+            <a:extLst>
+              <a:ext uri="{28A0092B-C50C-407E-A947-70E740481C1C}">
+                <a14:useLocalDpi xmlns:a14="http://schemas.microsoft.com/office/drawing/2010/main" val="0"/>
+              </a:ext>
+            </a:extLst>
+          </a:blip>
+          <a:srcRect/>
+          <a:stretch>
+            <a:fillRect/>
+          </a:stretch>
+        </p:blipFill>
+        <p:spPr bwMode="auto">
+          <a:xfrm>
+            <a:off x="6858000" y="6096000"/>
+            <a:ext cx="2286000" cy="762000"/>
+          </a:xfrm>
+          <a:prstGeom prst="rect">
+            <a:avLst/>
+          </a:prstGeom>
+          <a:noFill/>
+          <a:ln>
+            <a:noFill/>
+          </a:ln>
+          <a:effectLst/>
+          <a:extLst>
+            <a:ext uri="{909E8E84-426E-40DD-AFC4-6F175D3DCCD1}">
+              <a14:hiddenFill xmlns:a14="http://schemas.microsoft.com/office/drawing/2010/main">
+                <a:solidFill>
+                  <a:schemeClr val="accent1"/>
+                </a:solidFill>
+              </a14:hiddenFill>
+            </a:ext>
+            <a:ext uri="{91240B29-F687-4F45-9708-019B960494DF}">
+              <a14:hiddenLine xmlns:a14="http://schemas.microsoft.com/office/drawing/2010/main" w="9525">
+                <a:solidFill>
+                  <a:schemeClr val="tx1"/>
+                </a:solidFill>
+                <a:miter lim="800000"/>
+                <a:headEnd/>
+                <a:tailEnd/>
+              </a14:hiddenLine>
+            </a:ext>
+            <a:ext uri="{AF507438-7753-43E0-B8FC-AC1667EBCBE1}">
+              <a14:hiddenEffects xmlns:a14="http://schemas.microsoft.com/office/drawing/2010/main">
+                <a:effectLst>
+                  <a:outerShdw dist="35921" dir="2700000" algn="ctr" rotWithShape="0">
+                    <a:schemeClr val="bg2"/>
+                  </a:outerShdw>
+                </a:effectLst>
+              </a14:hiddenEffects>
+            </a:ext>
+          </a:extLst>
+        </p:spPr>
+      </p:pic>
     </p:spTree>
   </p:cSld>
   <p:clrMapOvr>
     <a:masterClrMapping/>
   </p:clrMapOvr>
+  <p:timing>
+    <p:tnLst>
+      <p:par>
+        <p:cTn id="1" dur="indefinite" restart="never" nodeType="tmRoot"/>
+      </p:par>
+    </p:tnLst>
+  </p:timing>
 </p:sldLayout>
 </file>
 
@@ -4291,7 +5039,7 @@
             <a:fld id="{1D8BD707-D9CF-40AE-B4C6-C98DA3205C09}" type="datetimeFigureOut">
               <a:rPr lang="en-US" smtClean="0"/>
               <a:pPr/>
-              <a:t>11/27/2013</a:t>
+              <a:t>12/4/2013</a:t>
             </a:fld>
             <a:endParaRPr lang="en-US"/>
           </a:p>
@@ -4340,11 +5088,82 @@
           </a:p>
         </p:txBody>
       </p:sp>
+      <p:pic>
+        <p:nvPicPr>
+          <p:cNvPr id="6" name="Picture 2"/>
+          <p:cNvPicPr>
+            <a:picLocks noChangeAspect="1" noChangeArrowheads="1"/>
+          </p:cNvPicPr>
+          <p:nvPr userDrawn="1"/>
+        </p:nvPicPr>
+        <p:blipFill>
+          <a:blip r:embed="rId2" cstate="print">
+            <a:extLst>
+              <a:ext uri="{28A0092B-C50C-407E-A947-70E740481C1C}">
+                <a14:useLocalDpi xmlns:a14="http://schemas.microsoft.com/office/drawing/2010/main" val="0"/>
+              </a:ext>
+            </a:extLst>
+          </a:blip>
+          <a:srcRect/>
+          <a:stretch>
+            <a:fillRect/>
+          </a:stretch>
+        </p:blipFill>
+        <p:spPr bwMode="auto">
+          <a:xfrm>
+            <a:off x="6858000" y="6096000"/>
+            <a:ext cx="2286000" cy="762000"/>
+          </a:xfrm>
+          <a:prstGeom prst="rect">
+            <a:avLst/>
+          </a:prstGeom>
+          <a:noFill/>
+          <a:ln>
+            <a:noFill/>
+          </a:ln>
+          <a:effectLst/>
+          <a:extLst>
+            <a:ext uri="{909E8E84-426E-40DD-AFC4-6F175D3DCCD1}">
+              <a14:hiddenFill xmlns:a14="http://schemas.microsoft.com/office/drawing/2010/main">
+                <a:solidFill>
+                  <a:schemeClr val="accent1"/>
+                </a:solidFill>
+              </a14:hiddenFill>
+            </a:ext>
+            <a:ext uri="{91240B29-F687-4F45-9708-019B960494DF}">
+              <a14:hiddenLine xmlns:a14="http://schemas.microsoft.com/office/drawing/2010/main" w="9525">
+                <a:solidFill>
+                  <a:schemeClr val="tx1"/>
+                </a:solidFill>
+                <a:miter lim="800000"/>
+                <a:headEnd/>
+                <a:tailEnd/>
+              </a14:hiddenLine>
+            </a:ext>
+            <a:ext uri="{AF507438-7753-43E0-B8FC-AC1667EBCBE1}">
+              <a14:hiddenEffects xmlns:a14="http://schemas.microsoft.com/office/drawing/2010/main">
+                <a:effectLst>
+                  <a:outerShdw dist="35921" dir="2700000" algn="ctr" rotWithShape="0">
+                    <a:schemeClr val="bg2"/>
+                  </a:outerShdw>
+                </a:effectLst>
+              </a14:hiddenEffects>
+            </a:ext>
+          </a:extLst>
+        </p:spPr>
+      </p:pic>
     </p:spTree>
   </p:cSld>
   <p:clrMapOvr>
     <a:masterClrMapping/>
   </p:clrMapOvr>
+  <p:timing>
+    <p:tnLst>
+      <p:par>
+        <p:cTn id="1" dur="indefinite" restart="never" nodeType="tmRoot"/>
+      </p:par>
+    </p:tnLst>
+  </p:timing>
 </p:sldLayout>
 </file>
 
@@ -4383,7 +5202,7 @@
             <a:fld id="{1D8BD707-D9CF-40AE-B4C6-C98DA3205C09}" type="datetimeFigureOut">
               <a:rPr lang="en-US" smtClean="0"/>
               <a:pPr/>
-              <a:t>11/27/2013</a:t>
+              <a:t>12/4/2013</a:t>
             </a:fld>
             <a:endParaRPr lang="en-US"/>
           </a:p>
@@ -4432,11 +5251,82 @@
           </a:p>
         </p:txBody>
       </p:sp>
+      <p:pic>
+        <p:nvPicPr>
+          <p:cNvPr id="5" name="Picture 2"/>
+          <p:cNvPicPr>
+            <a:picLocks noChangeAspect="1" noChangeArrowheads="1"/>
+          </p:cNvPicPr>
+          <p:nvPr userDrawn="1"/>
+        </p:nvPicPr>
+        <p:blipFill>
+          <a:blip r:embed="rId2" cstate="print">
+            <a:extLst>
+              <a:ext uri="{28A0092B-C50C-407E-A947-70E740481C1C}">
+                <a14:useLocalDpi xmlns:a14="http://schemas.microsoft.com/office/drawing/2010/main" val="0"/>
+              </a:ext>
+            </a:extLst>
+          </a:blip>
+          <a:srcRect/>
+          <a:stretch>
+            <a:fillRect/>
+          </a:stretch>
+        </p:blipFill>
+        <p:spPr bwMode="auto">
+          <a:xfrm>
+            <a:off x="6858000" y="6096000"/>
+            <a:ext cx="2286000" cy="762000"/>
+          </a:xfrm>
+          <a:prstGeom prst="rect">
+            <a:avLst/>
+          </a:prstGeom>
+          <a:noFill/>
+          <a:ln>
+            <a:noFill/>
+          </a:ln>
+          <a:effectLst/>
+          <a:extLst>
+            <a:ext uri="{909E8E84-426E-40DD-AFC4-6F175D3DCCD1}">
+              <a14:hiddenFill xmlns:a14="http://schemas.microsoft.com/office/drawing/2010/main">
+                <a:solidFill>
+                  <a:schemeClr val="accent1"/>
+                </a:solidFill>
+              </a14:hiddenFill>
+            </a:ext>
+            <a:ext uri="{91240B29-F687-4F45-9708-019B960494DF}">
+              <a14:hiddenLine xmlns:a14="http://schemas.microsoft.com/office/drawing/2010/main" w="9525">
+                <a:solidFill>
+                  <a:schemeClr val="tx1"/>
+                </a:solidFill>
+                <a:miter lim="800000"/>
+                <a:headEnd/>
+                <a:tailEnd/>
+              </a14:hiddenLine>
+            </a:ext>
+            <a:ext uri="{AF507438-7753-43E0-B8FC-AC1667EBCBE1}">
+              <a14:hiddenEffects xmlns:a14="http://schemas.microsoft.com/office/drawing/2010/main">
+                <a:effectLst>
+                  <a:outerShdw dist="35921" dir="2700000" algn="ctr" rotWithShape="0">
+                    <a:schemeClr val="bg2"/>
+                  </a:outerShdw>
+                </a:effectLst>
+              </a14:hiddenEffects>
+            </a:ext>
+          </a:extLst>
+        </p:spPr>
+      </p:pic>
     </p:spTree>
   </p:cSld>
   <p:clrMapOvr>
     <a:masterClrMapping/>
   </p:clrMapOvr>
+  <p:timing>
+    <p:tnLst>
+      <p:par>
+        <p:cTn id="1" dur="indefinite" restart="never" nodeType="tmRoot"/>
+      </p:par>
+    </p:tnLst>
+  </p:timing>
 </p:sldLayout>
 </file>
 
@@ -4657,7 +5547,7 @@
             <a:fld id="{1D8BD707-D9CF-40AE-B4C6-C98DA3205C09}" type="datetimeFigureOut">
               <a:rPr lang="en-US" smtClean="0"/>
               <a:pPr/>
-              <a:t>11/27/2013</a:t>
+              <a:t>12/4/2013</a:t>
             </a:fld>
             <a:endParaRPr lang="en-US"/>
           </a:p>
@@ -4706,11 +5596,82 @@
           </a:p>
         </p:txBody>
       </p:sp>
+      <p:pic>
+        <p:nvPicPr>
+          <p:cNvPr id="8" name="Picture 2"/>
+          <p:cNvPicPr>
+            <a:picLocks noChangeAspect="1" noChangeArrowheads="1"/>
+          </p:cNvPicPr>
+          <p:nvPr userDrawn="1"/>
+        </p:nvPicPr>
+        <p:blipFill>
+          <a:blip r:embed="rId2" cstate="print">
+            <a:extLst>
+              <a:ext uri="{28A0092B-C50C-407E-A947-70E740481C1C}">
+                <a14:useLocalDpi xmlns:a14="http://schemas.microsoft.com/office/drawing/2010/main" val="0"/>
+              </a:ext>
+            </a:extLst>
+          </a:blip>
+          <a:srcRect/>
+          <a:stretch>
+            <a:fillRect/>
+          </a:stretch>
+        </p:blipFill>
+        <p:spPr bwMode="auto">
+          <a:xfrm>
+            <a:off x="6858000" y="6096000"/>
+            <a:ext cx="2286000" cy="762000"/>
+          </a:xfrm>
+          <a:prstGeom prst="rect">
+            <a:avLst/>
+          </a:prstGeom>
+          <a:noFill/>
+          <a:ln>
+            <a:noFill/>
+          </a:ln>
+          <a:effectLst/>
+          <a:extLst>
+            <a:ext uri="{909E8E84-426E-40DD-AFC4-6F175D3DCCD1}">
+              <a14:hiddenFill xmlns:a14="http://schemas.microsoft.com/office/drawing/2010/main">
+                <a:solidFill>
+                  <a:schemeClr val="accent1"/>
+                </a:solidFill>
+              </a14:hiddenFill>
+            </a:ext>
+            <a:ext uri="{91240B29-F687-4F45-9708-019B960494DF}">
+              <a14:hiddenLine xmlns:a14="http://schemas.microsoft.com/office/drawing/2010/main" w="9525">
+                <a:solidFill>
+                  <a:schemeClr val="tx1"/>
+                </a:solidFill>
+                <a:miter lim="800000"/>
+                <a:headEnd/>
+                <a:tailEnd/>
+              </a14:hiddenLine>
+            </a:ext>
+            <a:ext uri="{AF507438-7753-43E0-B8FC-AC1667EBCBE1}">
+              <a14:hiddenEffects xmlns:a14="http://schemas.microsoft.com/office/drawing/2010/main">
+                <a:effectLst>
+                  <a:outerShdw dist="35921" dir="2700000" algn="ctr" rotWithShape="0">
+                    <a:schemeClr val="bg2"/>
+                  </a:outerShdw>
+                </a:effectLst>
+              </a14:hiddenEffects>
+            </a:ext>
+          </a:extLst>
+        </p:spPr>
+      </p:pic>
     </p:spTree>
   </p:cSld>
   <p:clrMapOvr>
     <a:masterClrMapping/>
   </p:clrMapOvr>
+  <p:timing>
+    <p:tnLst>
+      <p:par>
+        <p:cTn id="1" dur="indefinite" restart="never" nodeType="tmRoot"/>
+      </p:par>
+    </p:tnLst>
+  </p:timing>
 </p:sldLayout>
 </file>
 
@@ -4907,7 +5868,7 @@
             <a:fld id="{1D8BD707-D9CF-40AE-B4C6-C98DA3205C09}" type="datetimeFigureOut">
               <a:rPr lang="en-US" smtClean="0"/>
               <a:pPr/>
-              <a:t>11/27/2013</a:t>
+              <a:t>12/4/2013</a:t>
             </a:fld>
             <a:endParaRPr lang="en-US"/>
           </a:p>
@@ -4956,11 +5917,82 @@
           </a:p>
         </p:txBody>
       </p:sp>
+      <p:pic>
+        <p:nvPicPr>
+          <p:cNvPr id="8" name="Picture 2"/>
+          <p:cNvPicPr>
+            <a:picLocks noChangeAspect="1" noChangeArrowheads="1"/>
+          </p:cNvPicPr>
+          <p:nvPr userDrawn="1"/>
+        </p:nvPicPr>
+        <p:blipFill>
+          <a:blip r:embed="rId2" cstate="print">
+            <a:extLst>
+              <a:ext uri="{28A0092B-C50C-407E-A947-70E740481C1C}">
+                <a14:useLocalDpi xmlns:a14="http://schemas.microsoft.com/office/drawing/2010/main" val="0"/>
+              </a:ext>
+            </a:extLst>
+          </a:blip>
+          <a:srcRect/>
+          <a:stretch>
+            <a:fillRect/>
+          </a:stretch>
+        </p:blipFill>
+        <p:spPr bwMode="auto">
+          <a:xfrm>
+            <a:off x="6858000" y="6096000"/>
+            <a:ext cx="2286000" cy="762000"/>
+          </a:xfrm>
+          <a:prstGeom prst="rect">
+            <a:avLst/>
+          </a:prstGeom>
+          <a:noFill/>
+          <a:ln>
+            <a:noFill/>
+          </a:ln>
+          <a:effectLst/>
+          <a:extLst>
+            <a:ext uri="{909E8E84-426E-40DD-AFC4-6F175D3DCCD1}">
+              <a14:hiddenFill xmlns:a14="http://schemas.microsoft.com/office/drawing/2010/main">
+                <a:solidFill>
+                  <a:schemeClr val="accent1"/>
+                </a:solidFill>
+              </a14:hiddenFill>
+            </a:ext>
+            <a:ext uri="{91240B29-F687-4F45-9708-019B960494DF}">
+              <a14:hiddenLine xmlns:a14="http://schemas.microsoft.com/office/drawing/2010/main" w="9525">
+                <a:solidFill>
+                  <a:schemeClr val="tx1"/>
+                </a:solidFill>
+                <a:miter lim="800000"/>
+                <a:headEnd/>
+                <a:tailEnd/>
+              </a14:hiddenLine>
+            </a:ext>
+            <a:ext uri="{AF507438-7753-43E0-B8FC-AC1667EBCBE1}">
+              <a14:hiddenEffects xmlns:a14="http://schemas.microsoft.com/office/drawing/2010/main">
+                <a:effectLst>
+                  <a:outerShdw dist="35921" dir="2700000" algn="ctr" rotWithShape="0">
+                    <a:schemeClr val="bg2"/>
+                  </a:outerShdw>
+                </a:effectLst>
+              </a14:hiddenEffects>
+            </a:ext>
+          </a:extLst>
+        </p:spPr>
+      </p:pic>
     </p:spTree>
   </p:cSld>
   <p:clrMapOvr>
     <a:masterClrMapping/>
   </p:clrMapOvr>
+  <p:timing>
+    <p:tnLst>
+      <p:par>
+        <p:cTn id="1" dur="indefinite" restart="never" nodeType="tmRoot"/>
+      </p:par>
+    </p:tnLst>
+  </p:timing>
 </p:sldLayout>
 </file>
 
@@ -5117,7 +6149,7 @@
             <a:fld id="{1D8BD707-D9CF-40AE-B4C6-C98DA3205C09}" type="datetimeFigureOut">
               <a:rPr lang="en-US" smtClean="0"/>
               <a:pPr/>
-              <a:t>11/27/2013</a:t>
+              <a:t>12/4/2013</a:t>
             </a:fld>
             <a:endParaRPr lang="en-US"/>
           </a:p>
@@ -5202,6 +6234,70 @@
           </a:p>
         </p:txBody>
       </p:sp>
+      <p:pic>
+        <p:nvPicPr>
+          <p:cNvPr id="7" name="Picture 2"/>
+          <p:cNvPicPr>
+            <a:picLocks noChangeAspect="1" noChangeArrowheads="1"/>
+          </p:cNvPicPr>
+          <p:nvPr userDrawn="1"/>
+        </p:nvPicPr>
+        <p:blipFill>
+          <a:blip r:embed="rId13" cstate="print">
+            <a:extLst>
+              <a:ext uri="{28A0092B-C50C-407E-A947-70E740481C1C}">
+                <a14:useLocalDpi xmlns:a14="http://schemas.microsoft.com/office/drawing/2010/main" val="0"/>
+              </a:ext>
+            </a:extLst>
+          </a:blip>
+          <a:srcRect/>
+          <a:stretch>
+            <a:fillRect/>
+          </a:stretch>
+        </p:blipFill>
+        <p:spPr bwMode="auto">
+          <a:xfrm>
+            <a:off x="6858000" y="6096000"/>
+            <a:ext cx="2286000" cy="762000"/>
+          </a:xfrm>
+          <a:prstGeom prst="rect">
+            <a:avLst/>
+          </a:prstGeom>
+          <a:noFill/>
+          <a:ln>
+            <a:noFill/>
+          </a:ln>
+          <a:effectLst/>
+          <a:extLst>
+            <a:ext uri="{909E8E84-426E-40DD-AFC4-6F175D3DCCD1}">
+              <a14:hiddenFill xmlns:a14="http://schemas.microsoft.com/office/drawing/2010/main">
+                <a:solidFill>
+                  <a:schemeClr val="accent1"/>
+                </a:solidFill>
+              </a14:hiddenFill>
+            </a:ext>
+            <a:ext uri="{91240B29-F687-4F45-9708-019B960494DF}">
+              <a14:hiddenLine xmlns:a14="http://schemas.microsoft.com/office/drawing/2010/main" w="9525">
+                <a:solidFill>
+                  <a:schemeClr val="tx1"/>
+                </a:solidFill>
+                <a:miter lim="800000"/>
+                <a:headEnd/>
+                <a:tailEnd/>
+              </a14:hiddenLine>
+            </a:ext>
+            <a:ext uri="{AF507438-7753-43E0-B8FC-AC1667EBCBE1}">
+              <a14:hiddenEffects xmlns:a14="http://schemas.microsoft.com/office/drawing/2010/main">
+                <a:effectLst>
+                  <a:outerShdw dist="35921" dir="2700000" algn="ctr" rotWithShape="0">
+                    <a:schemeClr val="bg2"/>
+                  </a:outerShdw>
+                </a:effectLst>
+              </a14:hiddenEffects>
+            </a:ext>
+          </a:extLst>
+        </p:spPr>
+      </p:pic>
     </p:spTree>
   </p:cSld>
   <p:clrMap bg1="lt1" tx1="dk1" bg2="lt2" tx2="dk2" accent1="accent1" accent2="accent2" accent3="accent3" accent4="accent4" accent5="accent5" accent6="accent6" hlink="hlink" folHlink="folHlink"/>
@@ -5218,6 +6314,13 @@
     <p:sldLayoutId id="2147483658" r:id="rId10"/>
     <p:sldLayoutId id="2147483659" r:id="rId11"/>
   </p:sldLayoutIdLst>
+  <p:timing>
+    <p:tnLst>
+      <p:par>
+        <p:cTn id="1" dur="indefinite" restart="never" nodeType="tmRoot"/>
+      </p:par>
+    </p:tnLst>
+  </p:timing>
   <p:txStyles>
     <p:titleStyle>
       <a:lvl1pPr algn="ctr" defTabSz="914400" rtl="0" eaLnBrk="1" latinLnBrk="0" hangingPunct="1">
@@ -5512,11 +6615,11 @@
           <a:p>
             <a:r>
               <a:rPr lang="en-US" dirty="0"/>
-              <a:t>Using Code Inspection to Detect and Manage Potential Security </a:t>
-            </a:r>
-            <a:r>
-              <a:rPr lang="en-US" dirty="0" smtClean="0"/>
-              <a:t>Vulnerabilities</a:t>
+              <a:t>Using Code Inspection to Detect </a:t>
+            </a:r>
+            <a:r>
+              <a:rPr lang="en-US" dirty="0" smtClean="0"/>
+              <a:t>Security Vulnerabilities and Manage Potential Ones</a:t>
             </a:r>
             <a:endParaRPr lang="en-US" dirty="0"/>
           </a:p>
@@ -5532,10 +6635,15 @@
             <p:ph type="subTitle" idx="1"/>
           </p:nvPr>
         </p:nvSpPr>
-        <p:spPr/>
+        <p:spPr>
+          <a:xfrm>
+            <a:off x="1371600" y="3886200"/>
+            <a:ext cx="6400800" cy="2057400"/>
+          </a:xfrm>
+        </p:spPr>
         <p:txBody>
           <a:bodyPr>
-            <a:normAutofit fontScale="92500" lnSpcReduction="20000"/>
+            <a:normAutofit fontScale="77500" lnSpcReduction="20000"/>
           </a:bodyPr>
           <a:lstStyle/>
           <a:p>
@@ -5561,12 +6669,18 @@
           </a:p>
           <a:p>
             <a:r>
-              <a:rPr lang="en-US" dirty="0" smtClean="0"/>
+              <a:rPr lang="en-US" b="1" dirty="0" smtClean="0"/>
               <a:t>Chris </a:t>
             </a:r>
             <a:r>
-              <a:rPr lang="en-US" dirty="0" smtClean="0"/>
+              <a:rPr lang="en-US" b="1" dirty="0" smtClean="0"/>
               <a:t>Shaffer</a:t>
+            </a:r>
+          </a:p>
+          <a:p>
+            <a:r>
+              <a:rPr lang="en-US" dirty="0" smtClean="0"/>
+              <a:t>Director of Engineering, Relationship Science</a:t>
             </a:r>
             <a:endParaRPr lang="en-US" dirty="0"/>
           </a:p>
@@ -5754,15 +6868,7 @@
           <a:p>
             <a:r>
               <a:rPr lang="en-US" dirty="0" smtClean="0"/>
-              <a:t>If the victim user is logged into that site, and opens this link in the same browser, it’s going to use their login cookie and execute as if they </a:t>
-            </a:r>
-            <a:r>
-              <a:rPr lang="en-US" dirty="0" smtClean="0"/>
-              <a:t>clicked the ‘post a message’ button </a:t>
-            </a:r>
-            <a:r>
-              <a:rPr lang="en-US" dirty="0" smtClean="0"/>
-              <a:t>themselves.</a:t>
+              <a:t>If the victim user is logged into that site, and opens this link in the same browser, it’s going to use their login cookie and execute as if they clicked the ‘post a message’ button themselves.</a:t>
             </a:r>
             <a:endParaRPr lang="en-US" dirty="0"/>
           </a:p>
@@ -5855,13 +6961,7 @@
               <a:rPr lang="en-US" u="sng" dirty="0" smtClean="0">
                 <a:hlinkClick r:id="rId3"/>
               </a:rPr>
-              <a:t>https</a:t>
-            </a:r>
-            <a:r>
-              <a:rPr lang="en-US" u="sng" dirty="0" smtClean="0">
-                <a:hlinkClick r:id="rId3"/>
-              </a:rPr>
-              <a:t>://nostalgia-forum.com/post?somecrap=look-nontechnical-users-arent-even-going-to-read-this-seriously-its-techie-computer-nerd-stuff&amp;nonsense=30ijrf3j09fij3ef09j3f0i3j2390fj30i4h4309u3409hf30f9h340&amp;text=O%20HALP%20I%20STILL%20HAS%20BIN%20PWN3D</a:t>
+              <a:t>https://nostalgia-forum.com/post?somecrap=look-nontechnical-users-arent-even-going-to-read-this-seriously-its-techie-computer-nerd-stuff&amp;nonsense=30ijrf3j09fij3ef09j3f0i3j2390fj30i4h4309u3409hf30f9h340&amp;text=O%20HALP%20I%20STILL%20HAS%20BIN%20PWN3D</a:t>
             </a:r>
             <a:r>
               <a:rPr lang="en-US" dirty="0" smtClean="0"/>
@@ -5925,15 +7025,7 @@
           <a:p>
             <a:r>
               <a:rPr lang="en-US" dirty="0" smtClean="0"/>
-              <a:t>“Oh, I use </a:t>
-            </a:r>
-            <a:r>
-              <a:rPr lang="en-US" dirty="0" smtClean="0"/>
-              <a:t>the Nostalgia Forum </a:t>
-            </a:r>
-            <a:r>
-              <a:rPr lang="en-US" dirty="0" smtClean="0"/>
-              <a:t>all the time, of </a:t>
+              <a:t>“Oh, I use the Nostalgia Forum all the time, of </a:t>
             </a:r>
             <a:r>
               <a:rPr lang="en-US" i="1" dirty="0" smtClean="0"/>
@@ -6024,11 +7116,7 @@
           <a:p>
             <a:r>
               <a:rPr lang="en-US" dirty="0" smtClean="0"/>
-              <a:t>An application-wide solution to not being that </a:t>
-            </a:r>
-            <a:r>
-              <a:rPr lang="en-US" dirty="0" smtClean="0"/>
-              <a:t>guy</a:t>
+              <a:t>An application-wide solution to not being that guy</a:t>
             </a:r>
             <a:endParaRPr lang="en-US" dirty="0"/>
           </a:p>
@@ -6119,11 +7207,7 @@
           <a:p>
             <a:r>
               <a:rPr lang="en-US" dirty="0" smtClean="0"/>
-              <a:t>This will ensure </a:t>
-            </a:r>
-            <a:r>
-              <a:rPr lang="en-US" dirty="0" smtClean="0"/>
-              <a:t>that a form submission to your site came </a:t>
+              <a:t>This will ensure that a form submission to your site came </a:t>
             </a:r>
             <a:r>
               <a:rPr lang="en-US" i="1" dirty="0" smtClean="0"/>
@@ -6133,7 +7217,6 @@
               <a:rPr lang="en-US" dirty="0" smtClean="0"/>
               <a:t> your site.</a:t>
             </a:r>
-            <a:endParaRPr lang="en-US" dirty="0" smtClean="0"/>
           </a:p>
           <a:p>
             <a:r>
@@ -6233,7 +7316,6 @@
               <a:rPr lang="en-US" dirty="0" smtClean="0"/>
               <a:t>To add a token to the page’s markup:</a:t>
             </a:r>
-            <a:endParaRPr lang="en-US" dirty="0" smtClean="0"/>
           </a:p>
         </p:txBody>
       </p:sp>
@@ -6608,7 +7690,6 @@
               <a:rPr lang="en-US" dirty="0" smtClean="0"/>
               <a:t>To check the token’s validity:</a:t>
             </a:r>
-            <a:endParaRPr lang="en-US" dirty="0" smtClean="0"/>
           </a:p>
         </p:txBody>
       </p:sp>
@@ -7030,8 +8111,8 @@
         </p:nvSpPr>
         <p:spPr>
           <a:xfrm>
-            <a:off x="501191" y="3450442"/>
-            <a:ext cx="8416086" cy="1754326"/>
+            <a:off x="228600" y="3450442"/>
+            <a:ext cx="9068589" cy="2308324"/>
           </a:xfrm>
           <a:prstGeom prst="rect">
             <a:avLst/>
@@ -7039,7 +8120,7 @@
           <a:noFill/>
         </p:spPr>
         <p:txBody>
-          <a:bodyPr wrap="none" rtlCol="0">
+          <a:bodyPr wrap="square" rtlCol="0">
             <a:spAutoFit/>
           </a:bodyPr>
           <a:lstStyle/>
@@ -7282,22 +8363,8 @@
                 </a:highlight>
                 <a:latin typeface="Consolas"/>
               </a:rPr>
-              <a:t>DeleteAllOfMyUserData</a:t>
-            </a:r>
-            <a:r>
-              <a:rPr lang="en-US" dirty="0">
-                <a:solidFill>
-                  <a:srgbClr val="000000"/>
-                </a:solidFill>
-                <a:highlight>
-                  <a:srgbClr val="FFFFFF"/>
-                </a:highlight>
-                <a:latin typeface="Consolas"/>
-              </a:rPr>
-              <a:t>()</a:t>
-            </a:r>
-          </a:p>
-          <a:p>
+              <a:t>TransferAllOfMyMonies</a:t>
+            </a:r>
             <a:r>
               <a:rPr lang="en-US" dirty="0" smtClean="0">
                 <a:solidFill>
@@ -7308,7 +8375,55 @@
                 </a:highlight>
                 <a:latin typeface="Consolas"/>
               </a:rPr>
-              <a:t>   {</a:t>
+              <a:t>(</a:t>
+            </a:r>
+            <a:r>
+              <a:rPr lang="en-US" dirty="0" err="1" smtClean="0">
+                <a:solidFill>
+                  <a:srgbClr val="0000FF"/>
+                </a:solidFill>
+                <a:highlight>
+                  <a:srgbClr val="FFFFFF"/>
+                </a:highlight>
+                <a:latin typeface="Consolas"/>
+              </a:rPr>
+              <a:t>int</a:t>
+            </a:r>
+            <a:r>
+              <a:rPr lang="en-US" dirty="0" smtClean="0">
+                <a:solidFill>
+                  <a:srgbClr val="0000FF"/>
+                </a:solidFill>
+                <a:highlight>
+                  <a:srgbClr val="FFFFFF"/>
+                </a:highlight>
+                <a:latin typeface="Consolas"/>
+              </a:rPr>
+              <a:t> </a:t>
+            </a:r>
+            <a:r>
+              <a:rPr lang="en-US" dirty="0" err="1" smtClean="0">
+                <a:solidFill>
+                  <a:srgbClr val="000000"/>
+                </a:solidFill>
+                <a:highlight>
+                  <a:srgbClr val="FFFFFF"/>
+                </a:highlight>
+                <a:latin typeface="Consolas"/>
+              </a:rPr>
+              <a:t>destinationAccount</a:t>
+            </a:r>
+            <a:r>
+              <a:rPr lang="en-US" dirty="0" smtClean="0">
+                <a:solidFill>
+                  <a:srgbClr val="000000"/>
+                </a:solidFill>
+                <a:highlight>
+                  <a:srgbClr val="FFFFFF"/>
+                </a:highlight>
+                <a:latin typeface="Consolas"/>
+              </a:rPr>
+              <a:t>)</a:t>
             </a:r>
             <a:endParaRPr lang="en-US" dirty="0">
               <a:solidFill>
@@ -7331,6 +8446,29 @@
                 </a:highlight>
                 <a:latin typeface="Consolas"/>
               </a:rPr>
+              <a:t>   {</a:t>
+            </a:r>
+            <a:endParaRPr lang="en-US" dirty="0">
+              <a:solidFill>
+                <a:srgbClr val="000000"/>
+              </a:solidFill>
+              <a:highlight>
+                <a:srgbClr val="FFFFFF"/>
+              </a:highlight>
+              <a:latin typeface="Consolas"/>
+            </a:endParaRPr>
+          </a:p>
+          <a:p>
+            <a:r>
+              <a:rPr lang="en-US" dirty="0" smtClean="0">
+                <a:solidFill>
+                  <a:srgbClr val="000000"/>
+                </a:solidFill>
+                <a:highlight>
+                  <a:srgbClr val="FFFFFF"/>
+                </a:highlight>
+                <a:latin typeface="Consolas"/>
+              </a:rPr>
               <a:t>      </a:t>
             </a:r>
             <a:r>
@@ -7391,9 +8529,57 @@
                 </a:highlight>
                 <a:latin typeface="Consolas"/>
               </a:rPr>
-              <a:t>, punk?</a:t>
-            </a:r>
-            <a:endParaRPr lang="en-US" dirty="0"/>
+              <a:t>, punk</a:t>
+            </a:r>
+            <a:r>
+              <a:rPr lang="en-US" dirty="0" smtClean="0">
+                <a:solidFill>
+                  <a:srgbClr val="008000"/>
+                </a:solidFill>
+                <a:highlight>
+                  <a:srgbClr val="FFFFFF"/>
+                </a:highlight>
+                <a:latin typeface="Consolas"/>
+              </a:rPr>
+              <a:t>?</a:t>
+            </a:r>
+          </a:p>
+          <a:p>
+            <a:r>
+              <a:rPr lang="en-US" dirty="0" smtClean="0">
+                <a:solidFill>
+                  <a:srgbClr val="000000"/>
+                </a:solidFill>
+                <a:highlight>
+                  <a:srgbClr val="FFFFFF"/>
+                </a:highlight>
+                <a:latin typeface="Consolas"/>
+              </a:rPr>
+              <a:t>   }</a:t>
+            </a:r>
+          </a:p>
+          <a:p>
+            <a:r>
+              <a:rPr lang="en-US" dirty="0" smtClean="0">
+                <a:solidFill>
+                  <a:srgbClr val="000000"/>
+                </a:solidFill>
+                <a:highlight>
+                  <a:srgbClr val="FFFFFF"/>
+                </a:highlight>
+                <a:latin typeface="Consolas"/>
+              </a:rPr>
+              <a:t>}</a:t>
+            </a:r>
+            <a:endParaRPr lang="en-US" dirty="0">
+              <a:solidFill>
+                <a:srgbClr val="000000"/>
+              </a:solidFill>
+              <a:highlight>
+                <a:srgbClr val="FFFFFF"/>
+              </a:highlight>
+              <a:latin typeface="Consolas"/>
+            </a:endParaRPr>
           </a:p>
         </p:txBody>
       </p:sp>
@@ -7703,11 +8889,7 @@
           <a:p>
             <a:r>
               <a:rPr lang="en-US" dirty="0" smtClean="0"/>
-              <a:t>Looks </a:t>
-            </a:r>
-            <a:r>
-              <a:rPr lang="en-US" dirty="0" smtClean="0"/>
-              <a:t>for any Action without </a:t>
+              <a:t>Looks for any Action without </a:t>
             </a:r>
             <a:r>
               <a:rPr lang="en-US" dirty="0">
@@ -7758,30 +8940,37 @@
           <a:p>
             <a:r>
               <a:rPr lang="en-US" dirty="0" smtClean="0"/>
-              <a:t>If </a:t>
-            </a:r>
-            <a:r>
-              <a:rPr lang="en-US" dirty="0" smtClean="0"/>
-              <a:t>the name of the Action contains any words that indicate editing of data…</a:t>
+              <a:t>If the name of the Action contains any words that indicate editing of data…</a:t>
             </a:r>
           </a:p>
           <a:p>
             <a:pPr lvl="1"/>
             <a:r>
               <a:rPr lang="en-US" dirty="0" smtClean="0"/>
-              <a:t>Save, Update, Edit, Delete, etc.</a:t>
-            </a:r>
-          </a:p>
-          <a:p>
-            <a:r>
-              <a:rPr lang="en-US" dirty="0" smtClean="0"/>
-              <a:t>… Or if it calls any functions named like </a:t>
-            </a:r>
-            <a:r>
-              <a:rPr lang="en-US" dirty="0" smtClean="0"/>
-              <a:t>that</a:t>
-            </a:r>
-            <a:endParaRPr lang="en-US" dirty="0" smtClean="0"/>
+              <a:t>Such as … Save</a:t>
+            </a:r>
+            <a:r>
+              <a:rPr lang="en-US" dirty="0" smtClean="0"/>
+              <a:t>, Update, Edit, Delete, etc.</a:t>
+            </a:r>
+          </a:p>
+          <a:p>
+            <a:r>
+              <a:rPr lang="en-US" dirty="0" smtClean="0"/>
+              <a:t>Or </a:t>
+            </a:r>
+            <a:r>
+              <a:rPr lang="en-US" dirty="0" smtClean="0"/>
+              <a:t>if it </a:t>
+            </a:r>
+            <a:r>
+              <a:rPr lang="en-US" i="1" dirty="0" smtClean="0"/>
+              <a:t>calls</a:t>
+            </a:r>
+            <a:r>
+              <a:rPr lang="en-US" dirty="0" smtClean="0"/>
+              <a:t> any functions named like that</a:t>
+            </a:r>
           </a:p>
           <a:p>
             <a:r>
@@ -7875,11 +9064,7 @@
           <a:p>
             <a:r>
               <a:rPr lang="en-US" dirty="0" smtClean="0"/>
-              <a:t>We </a:t>
-            </a:r>
-            <a:r>
-              <a:rPr lang="en-US" dirty="0" smtClean="0"/>
-              <a:t>flag anything that’s missing an </a:t>
+              <a:t>We flag anything that’s missing an </a:t>
             </a:r>
             <a:r>
               <a:rPr lang="en-US" dirty="0">
@@ -7919,11 +9104,7 @@
             </a:r>
             <a:r>
               <a:rPr lang="en-US" dirty="0" smtClean="0"/>
-              <a:t> </a:t>
-            </a:r>
-            <a:r>
-              <a:rPr lang="en-US" dirty="0" smtClean="0"/>
-              <a:t>or </a:t>
+              <a:t> or </a:t>
             </a:r>
             <a:r>
               <a:rPr lang="en-US" dirty="0">
@@ -7963,11 +9144,7 @@
             </a:r>
             <a:r>
               <a:rPr lang="en-US" dirty="0" smtClean="0"/>
-              <a:t> </a:t>
-            </a:r>
-            <a:r>
-              <a:rPr lang="en-US" dirty="0" smtClean="0"/>
-              <a:t>tag.</a:t>
+              <a:t> tag.</a:t>
             </a:r>
           </a:p>
           <a:p>
@@ -7982,28 +9159,29 @@
             </a:r>
           </a:p>
           <a:p>
-            <a:pPr lvl="1"/>
-            <a:r>
-              <a:rPr lang="en-US" dirty="0" smtClean="0"/>
-              <a:t>Basically, this ends up being a method of making sure </a:t>
-            </a:r>
-            <a:r>
-              <a:rPr lang="en-US" dirty="0" smtClean="0"/>
-              <a:t>new code that </a:t>
-            </a:r>
-            <a:r>
-              <a:rPr lang="en-US" dirty="0" smtClean="0"/>
-              <a:t>adds to our attack surface is code reviewed, eventually</a:t>
-            </a:r>
-            <a:r>
-              <a:rPr lang="en-US" dirty="0" smtClean="0"/>
-              <a:t>.</a:t>
-            </a:r>
-          </a:p>
-          <a:p>
+            <a:r>
+              <a:rPr lang="en-US" dirty="0" smtClean="0"/>
+              <a:t>To catch cases </a:t>
+            </a:r>
+            <a:r>
+              <a:rPr lang="en-US" dirty="0" smtClean="0"/>
+              <a:t>in which </a:t>
+            </a:r>
+            <a:r>
+              <a:rPr lang="en-US" dirty="0" smtClean="0"/>
+              <a:t>a </a:t>
+            </a:r>
             <a:r>
               <a:rPr lang="en-US" dirty="0"/>
-              <a:t>In case there’s a data-altering function without one of those keywords</a:t>
+              <a:t>data-altering function </a:t>
+            </a:r>
+            <a:r>
+              <a:rPr lang="en-US" dirty="0" smtClean="0"/>
+              <a:t>doesn’t contain one </a:t>
+            </a:r>
+            <a:r>
+              <a:rPr lang="en-US" dirty="0"/>
+              <a:t>of those keywords</a:t>
             </a:r>
           </a:p>
           <a:p>
@@ -8022,6 +9200,20 @@
             <a:r>
               <a:rPr lang="en-US" dirty="0" smtClean="0"/>
               <a:t>typo</a:t>
+            </a:r>
+          </a:p>
+          <a:p>
+            <a:pPr marL="342900" lvl="1" indent="-342900">
+              <a:buFont typeface="Arial" pitchFamily="34" charset="0"/>
+              <a:buChar char="•"/>
+            </a:pPr>
+            <a:r>
+              <a:rPr lang="en-US" dirty="0"/>
+              <a:t>Basically, this ends up being a way of making sure new code that adds to our attack surface is tracked and code reviewed</a:t>
+            </a:r>
+            <a:r>
+              <a:rPr lang="en-US" dirty="0" smtClean="0"/>
+              <a:t>.</a:t>
             </a:r>
             <a:endParaRPr lang="en-US" dirty="0"/>
           </a:p>
@@ -8130,15 +9322,7 @@
           <a:p>
             <a:r>
               <a:rPr lang="en-US" dirty="0" smtClean="0"/>
-              <a:t>Management and </a:t>
-            </a:r>
-            <a:r>
-              <a:rPr lang="en-US" dirty="0" smtClean="0"/>
-              <a:t>inventory </a:t>
-            </a:r>
-            <a:r>
-              <a:rPr lang="en-US" dirty="0" smtClean="0"/>
-              <a:t>of application’s attack surface</a:t>
+              <a:t>Management and inventory of application’s attack surface</a:t>
             </a:r>
           </a:p>
           <a:p>
@@ -9236,19 +10420,7 @@
                 </a:highlight>
                 <a:latin typeface="Consolas"/>
               </a:rPr>
-              <a:t>  </a:t>
-            </a:r>
-            <a:r>
-              <a:rPr lang="en-US" sz="1200" dirty="0" smtClean="0">
-                <a:solidFill>
-                  <a:srgbClr val="000000"/>
-                </a:solidFill>
-                <a:highlight>
-                  <a:srgbClr val="FFFFFF"/>
-                </a:highlight>
-                <a:latin typeface="Consolas"/>
-              </a:rPr>
-              <a:t>{</a:t>
+              <a:t>  {</a:t>
             </a:r>
             <a:endParaRPr lang="en-US" sz="1200" dirty="0">
               <a:solidFill>
@@ -10857,23 +12029,7 @@
           <a:p>
             <a:r>
               <a:rPr lang="en-US" dirty="0" smtClean="0"/>
-              <a:t>Our setup: </a:t>
-            </a:r>
-            <a:r>
-              <a:rPr lang="en-US" dirty="0" smtClean="0"/>
-              <a:t>Any </a:t>
-            </a:r>
-            <a:r>
-              <a:rPr lang="en-US" dirty="0" smtClean="0"/>
-              <a:t>request is required to be authenticated by </a:t>
-            </a:r>
-            <a:r>
-              <a:rPr lang="en-US" dirty="0" smtClean="0"/>
-              <a:t>default; any </a:t>
-            </a:r>
-            <a:r>
-              <a:rPr lang="en-US" dirty="0" smtClean="0"/>
-              <a:t>action that a developer wants to be accessed by an un-authenticated user has to be marked with a </a:t>
+              <a:t>Our setup: Any request is required to be authenticated by default; any action that a developer wants to be accessed by an un-authenticated user has to be marked with a </a:t>
             </a:r>
             <a:r>
               <a:rPr lang="en-US" dirty="0" smtClean="0">
@@ -10913,11 +12069,7 @@
             </a:r>
             <a:r>
               <a:rPr lang="en-US" dirty="0" smtClean="0"/>
-              <a:t> </a:t>
-            </a:r>
-            <a:r>
-              <a:rPr lang="en-US" dirty="0" smtClean="0"/>
-              <a:t>attribute</a:t>
+              <a:t> attribute</a:t>
             </a:r>
           </a:p>
           <a:p>
@@ -10971,11 +12123,7 @@
             </a:r>
             <a:r>
               <a:rPr lang="en-US" dirty="0" smtClean="0"/>
-              <a:t> </a:t>
-            </a:r>
-            <a:r>
-              <a:rPr lang="en-US" dirty="0" smtClean="0"/>
-              <a:t>to be code reviewed.</a:t>
+              <a:t> to be code reviewed.</a:t>
             </a:r>
             <a:endParaRPr lang="en-US" dirty="0"/>
           </a:p>
@@ -11058,11 +12206,7 @@
           <a:p>
             <a:r>
               <a:rPr lang="en-US" dirty="0" smtClean="0"/>
-              <a:t>.NET provides </a:t>
-            </a:r>
-            <a:r>
-              <a:rPr lang="en-US" dirty="0" smtClean="0"/>
-              <a:t>attributes:</a:t>
+              <a:t>.NET provides attributes:</a:t>
             </a:r>
           </a:p>
           <a:p>
@@ -11110,20 +12254,18 @@
                 <a:latin typeface="Consolas" panose="020B0609020204030204" pitchFamily="49" charset="0"/>
                 <a:cs typeface="Consolas" panose="020B0609020204030204" pitchFamily="49" charset="0"/>
               </a:rPr>
-              <a:t>(Roles</a:t>
-            </a:r>
-            <a:r>
-              <a:rPr lang="en-US" dirty="0" smtClean="0">
-                <a:latin typeface="Consolas" panose="020B0609020204030204" pitchFamily="49" charset="0"/>
-                <a:cs typeface="Consolas" panose="020B0609020204030204" pitchFamily="49" charset="0"/>
-              </a:rPr>
-              <a:t>, Users, etc.)]</a:t>
+              <a:t>(Roles, Users, etc.)]</a:t>
             </a:r>
             <a:r>
               <a:rPr lang="en-US" dirty="0" smtClean="0"/>
               <a:t> </a:t>
             </a:r>
-            <a:endParaRPr lang="en-US" dirty="0" smtClean="0"/>
+          </a:p>
+          <a:p>
+            <a:r>
+              <a:rPr lang="en-US" dirty="0" smtClean="0"/>
+              <a:t>We use these to control access to premium features, and also administrative functions.</a:t>
+            </a:r>
           </a:p>
           <a:p>
             <a:r>
@@ -11142,7 +12284,15 @@
             </a:r>
             <a:r>
               <a:rPr lang="en-US" dirty="0" smtClean="0"/>
-              <a:t> rule to flag any Controller that doesn’t have this attribute specified.</a:t>
+              <a:t> </a:t>
+            </a:r>
+            <a:r>
+              <a:rPr lang="en-US" dirty="0" smtClean="0"/>
+              <a:t>rule: Flag </a:t>
+            </a:r>
+            <a:r>
+              <a:rPr lang="en-US" dirty="0" smtClean="0"/>
+              <a:t>any Controller that doesn’t have this attribute specified.</a:t>
             </a:r>
             <a:endParaRPr lang="en-US" dirty="0"/>
           </a:p>
@@ -11486,11 +12636,7 @@
             </a:pPr>
             <a:r>
               <a:rPr lang="en-US" sz="1800" dirty="0" smtClean="0"/>
-              <a:t>Replace </a:t>
-            </a:r>
-            <a:r>
-              <a:rPr lang="en-US" sz="1800" dirty="0" smtClean="0"/>
-              <a:t>this:</a:t>
+              <a:t>Replace this:</a:t>
             </a:r>
           </a:p>
         </p:txBody>
@@ -13193,7 +14339,7 @@
           <p:nvPr/>
         </p:nvPicPr>
         <p:blipFill>
-          <a:blip r:embed="rId2">
+          <a:blip r:embed="rId3">
             <a:extLst>
               <a:ext uri="{28A0092B-C50C-407E-A947-70E740481C1C}">
                 <a14:useLocalDpi xmlns:a14="http://schemas.microsoft.com/office/drawing/2010/main" val="0"/>
@@ -13919,27 +15065,7 @@
                   </a:schemeClr>
                 </a:solidFill>
               </a:rPr>
-              <a:t>… But seriously, use a </a:t>
-            </a:r>
-            <a:r>
-              <a:rPr lang="en-US" dirty="0" err="1" smtClean="0">
-                <a:solidFill>
-                  <a:schemeClr val="bg1">
-                    <a:lumMod val="65000"/>
-                  </a:schemeClr>
-                </a:solidFill>
-              </a:rPr>
-              <a:t>enum</a:t>
-            </a:r>
-            <a:r>
-              <a:rPr lang="en-US" dirty="0" smtClean="0">
-                <a:solidFill>
-                  <a:schemeClr val="bg1">
-                    <a:lumMod val="65000"/>
-                  </a:schemeClr>
-                </a:solidFill>
-              </a:rPr>
-              <a:t>.</a:t>
+              <a:t>…</a:t>
             </a:r>
             <a:endParaRPr lang="en-US" dirty="0">
               <a:solidFill>
@@ -15380,7 +16506,15 @@
             </a:r>
             <a:r>
               <a:rPr lang="en-US" dirty="0" smtClean="0"/>
-              <a:t> when databases, tables, structural pieces of queries are determined by parameters</a:t>
+              <a:t> when databases, tables</a:t>
+            </a:r>
+            <a:r>
+              <a:rPr lang="en-US" dirty="0" smtClean="0"/>
+              <a:t>, and/or </a:t>
+            </a:r>
+            <a:r>
+              <a:rPr lang="en-US" dirty="0" smtClean="0"/>
+              <a:t>structural pieces of queries are determined by parameters</a:t>
             </a:r>
           </a:p>
           <a:p>
@@ -15576,7 +16710,15 @@
           <a:p>
             <a:r>
               <a:rPr lang="en-US" dirty="0" smtClean="0"/>
-              <a:t>Rules for Best Practices</a:t>
+              <a:t>Rules </a:t>
+            </a:r>
+            <a:r>
+              <a:rPr lang="en-US" dirty="0" smtClean="0"/>
+              <a:t>to Enforce Best </a:t>
+            </a:r>
+            <a:r>
+              <a:rPr lang="en-US" dirty="0" smtClean="0"/>
+              <a:t>Practices</a:t>
             </a:r>
             <a:endParaRPr lang="en-US" dirty="0"/>
           </a:p>
@@ -15610,14 +16752,29 @@
           <a:p>
             <a:r>
               <a:rPr lang="en-US" dirty="0" smtClean="0"/>
-              <a:t>Emails sent directly through system library rather than our company’s library</a:t>
-            </a:r>
-          </a:p>
-          <a:p>
-            <a:r>
-              <a:rPr lang="en-US" dirty="0" smtClean="0"/>
-              <a:t>Using a .Context property on the data layer</a:t>
-            </a:r>
+              <a:t>Emails sent directly through </a:t>
+            </a:r>
+            <a:r>
+              <a:rPr lang="en-US" dirty="0" smtClean="0"/>
+              <a:t>the system </a:t>
+            </a:r>
+            <a:r>
+              <a:rPr lang="en-US" dirty="0" smtClean="0"/>
+              <a:t>library rather than our company’s library</a:t>
+            </a:r>
+          </a:p>
+          <a:p>
+            <a:r>
+              <a:rPr lang="en-US" dirty="0" smtClean="0"/>
+              <a:t>Using a .Context property on the data </a:t>
+            </a:r>
+            <a:r>
+              <a:rPr lang="en-US" dirty="0" smtClean="0"/>
+              <a:t>layer</a:t>
+            </a:r>
+          </a:p>
+          <a:p>
+            <a:endParaRPr lang="en-US" dirty="0" smtClean="0"/>
           </a:p>
           <a:p>
             <a:r>
@@ -15850,7 +17007,15 @@
             </a:r>
             <a:r>
               <a:rPr lang="en-US" dirty="0" smtClean="0"/>
-              <a:t>: Fail if the number of warnings or errors reaches a certain threshold.</a:t>
+              <a:t>: Fail if the number of warnings </a:t>
+            </a:r>
+            <a:r>
+              <a:rPr lang="en-US" dirty="0" smtClean="0"/>
+              <a:t>and/or </a:t>
+            </a:r>
+            <a:r>
+              <a:rPr lang="en-US" dirty="0" smtClean="0"/>
+              <a:t>errors reaches a certain threshold.</a:t>
             </a:r>
           </a:p>
           <a:p>
@@ -15983,7 +17148,27 @@
                   </a:schemeClr>
                 </a:solidFill>
               </a:rPr>
-              <a:t>No forgetting to setup scanning for new code.</a:t>
+              <a:t>No forgetting to </a:t>
+            </a:r>
+            <a:r>
+              <a:rPr lang="en-US" dirty="0" smtClean="0">
+                <a:solidFill>
+                  <a:schemeClr val="bg1">
+                    <a:lumMod val="65000"/>
+                  </a:schemeClr>
+                </a:solidFill>
+              </a:rPr>
+              <a:t>set up </a:t>
+            </a:r>
+            <a:r>
+              <a:rPr lang="en-US" dirty="0" smtClean="0">
+                <a:solidFill>
+                  <a:schemeClr val="bg1">
+                    <a:lumMod val="65000"/>
+                  </a:schemeClr>
+                </a:solidFill>
+              </a:rPr>
+              <a:t>scanning for new code.</a:t>
             </a:r>
             <a:endParaRPr lang="en-US" dirty="0">
               <a:solidFill>
@@ -16289,7 +17474,7 @@
           <p:nvPr/>
         </p:nvPicPr>
         <p:blipFill>
-          <a:blip r:embed="rId2">
+          <a:blip r:embed="rId3">
             <a:extLst>
               <a:ext uri="{28A0092B-C50C-407E-A947-70E740481C1C}">
                 <a14:useLocalDpi xmlns:a14="http://schemas.microsoft.com/office/drawing/2010/main" val="0"/>
@@ -16399,19 +17584,14 @@
         </p:spPr>
         <p:txBody>
           <a:bodyPr>
-            <a:normAutofit fontScale="92500" lnSpcReduction="10000"/>
+            <a:normAutofit lnSpcReduction="10000"/>
           </a:bodyPr>
           <a:lstStyle/>
           <a:p>
             <a:r>
               <a:rPr lang="en-US" dirty="0" smtClean="0"/>
-              <a:t>Code that’s not complied into an </a:t>
-            </a:r>
-            <a:r>
-              <a:rPr lang="en-US" dirty="0" smtClean="0"/>
-              <a:t>assembly …</a:t>
-            </a:r>
-            <a:endParaRPr lang="en-US" dirty="0" smtClean="0"/>
+              <a:t>Code that’s not complied into an assembly …</a:t>
+            </a:r>
           </a:p>
           <a:p>
             <a:pPr lvl="1"/>
@@ -16421,11 +17601,7 @@
             </a:r>
             <a:r>
               <a:rPr lang="en-US" dirty="0" smtClean="0"/>
-              <a:t>() in </a:t>
-            </a:r>
-            <a:r>
-              <a:rPr lang="en-US" dirty="0" smtClean="0"/>
-              <a:t>.</a:t>
+              <a:t>() in .</a:t>
             </a:r>
             <a:r>
               <a:rPr lang="en-US" dirty="0" err="1" smtClean="0"/>
@@ -16440,11 +17616,7 @@
             <a:pPr lvl="1"/>
             <a:r>
               <a:rPr lang="en-US" dirty="0" smtClean="0"/>
-              <a:t>Dynamic </a:t>
-            </a:r>
-            <a:r>
-              <a:rPr lang="en-US" dirty="0" smtClean="0"/>
-              <a:t>SQL </a:t>
+              <a:t>Dynamic SQL </a:t>
             </a:r>
             <a:r>
               <a:rPr lang="en-US" i="1" dirty="0" smtClean="0"/>
@@ -16466,23 +17638,7 @@
             <a:pPr lvl="2"/>
             <a:r>
               <a:rPr lang="en-US" dirty="0" smtClean="0"/>
-              <a:t>Example</a:t>
-            </a:r>
-            <a:r>
-              <a:rPr lang="en-US" dirty="0" smtClean="0"/>
-              <a:t>: </a:t>
-            </a:r>
-            <a:r>
-              <a:rPr lang="en-US" dirty="0" smtClean="0"/>
-              <a:t>Find code </a:t>
-            </a:r>
-            <a:r>
-              <a:rPr lang="en-US" dirty="0" smtClean="0"/>
-              <a:t>that makes a GET request to one of the actions turned up by the </a:t>
-            </a:r>
-            <a:r>
-              <a:rPr lang="en-US" dirty="0" smtClean="0"/>
-              <a:t>CSRF or JSON rules.</a:t>
+              <a:t>Example: Find code that makes a GET request to one of the actions turned up by the CSRF or JSON rules.</a:t>
             </a:r>
           </a:p>
           <a:p>
@@ -16490,18 +17646,9 @@
               <a:buNone/>
             </a:pPr>
             <a:r>
-              <a:rPr lang="en-US" dirty="0" smtClean="0"/>
-              <a:t>(so </a:t>
-            </a:r>
-            <a:r>
-              <a:rPr lang="en-US" dirty="0" smtClean="0"/>
-              <a:t>they don’t turn into page </a:t>
-            </a:r>
-            <a:r>
-              <a:rPr lang="en-US" dirty="0" smtClean="0"/>
-              <a:t>breaks when you fix the vulnerability)</a:t>
-            </a:r>
-            <a:endParaRPr lang="en-US" dirty="0" smtClean="0"/>
+              <a:rPr lang="en-US" sz="2000" dirty="0" smtClean="0"/>
+              <a:t>(so they don’t turn into page breaks when you fix the vulnerability)</a:t>
+            </a:r>
           </a:p>
           <a:p>
             <a:r>
@@ -16518,11 +17665,7 @@
           <a:p>
             <a:r>
               <a:rPr lang="en-US" dirty="0" smtClean="0"/>
-              <a:t>And many </a:t>
-            </a:r>
-            <a:r>
-              <a:rPr lang="en-US" dirty="0" smtClean="0"/>
-              <a:t>more …</a:t>
+              <a:t>And many more …</a:t>
             </a:r>
           </a:p>
         </p:txBody>
@@ -16741,7 +17884,11 @@
           <a:p>
             <a:r>
               <a:rPr lang="en-US" dirty="0" smtClean="0"/>
-              <a:t>Layers of Testing</a:t>
+              <a:t>When </a:t>
+            </a:r>
+            <a:r>
+              <a:rPr lang="en-US" dirty="0" smtClean="0"/>
+              <a:t>Testing Happens</a:t>
             </a:r>
             <a:endParaRPr lang="en-US" dirty="0"/>
           </a:p>
@@ -16975,8 +18122,8 @@
         </p:nvSpPr>
         <p:spPr>
           <a:xfrm>
-            <a:off x="2960016" y="2684288"/>
-            <a:ext cx="152400" cy="801274"/>
+            <a:off x="2960016" y="2438400"/>
+            <a:ext cx="152400" cy="1047162"/>
           </a:xfrm>
           <a:prstGeom prst="rightBrace">
             <a:avLst/>
@@ -17051,7 +18198,7 @@
         </p:nvSpPr>
         <p:spPr>
           <a:xfrm>
-            <a:off x="3950616" y="2856325"/>
+            <a:off x="3950616" y="2733381"/>
             <a:ext cx="2362200" cy="457200"/>
           </a:xfrm>
           <a:prstGeom prst="rect">
@@ -17145,7 +18292,7 @@
         </p:nvCxnSpPr>
         <p:spPr>
           <a:xfrm flipH="1">
-            <a:off x="3264816" y="3084925"/>
+            <a:off x="3264816" y="2961981"/>
             <a:ext cx="609600" cy="0"/>
           </a:xfrm>
           <a:prstGeom prst="line">
@@ -17282,27 +18429,14 @@
           <a:p>
             <a:r>
               <a:rPr lang="en-US" dirty="0" smtClean="0"/>
-              <a:t>Can </a:t>
-            </a:r>
-            <a:r>
-              <a:rPr lang="en-US" dirty="0" smtClean="0"/>
-              <a:t>run scans much faster</a:t>
-            </a:r>
-          </a:p>
-          <a:p>
-            <a:r>
-              <a:rPr lang="en-US" dirty="0" smtClean="0"/>
-              <a:t>Can </a:t>
-            </a:r>
-            <a:r>
-              <a:rPr lang="en-US" dirty="0" smtClean="0"/>
-              <a:t>detect unsafe functions before code that calls them is even </a:t>
-            </a:r>
-            <a:r>
-              <a:rPr lang="en-US" dirty="0" smtClean="0"/>
-              <a:t>written, poor design that doesn’t leave external evidence</a:t>
-            </a:r>
-            <a:endParaRPr lang="en-US" dirty="0" smtClean="0"/>
+              <a:t>Can run scans much faster</a:t>
+            </a:r>
+          </a:p>
+          <a:p>
+            <a:r>
+              <a:rPr lang="en-US" dirty="0" smtClean="0"/>
+              <a:t>Can detect unsafe functions before code that calls them is even written, poor design that doesn’t leave external evidence</a:t>
+            </a:r>
           </a:p>
           <a:p>
             <a:r>
@@ -17410,11 +18544,7 @@
           <a:p>
             <a:r>
               <a:rPr lang="en-US" dirty="0" smtClean="0"/>
-              <a:t>Avoid </a:t>
-            </a:r>
-            <a:r>
-              <a:rPr lang="en-US" dirty="0" smtClean="0"/>
-              <a:t>Uncalled Private Code</a:t>
+              <a:t>Avoid Uncalled Private Code</a:t>
             </a:r>
           </a:p>
           <a:p>
@@ -17422,7 +18552,6 @@
               <a:rPr lang="en-US" dirty="0" smtClean="0"/>
               <a:t>Review Unused Parameters</a:t>
             </a:r>
-            <a:endParaRPr lang="en-US" dirty="0" smtClean="0"/>
           </a:p>
           <a:p>
             <a:r>
@@ -17704,15 +18833,7 @@
           <a:p>
             <a:r>
               <a:rPr lang="en-US" sz="2800" dirty="0" smtClean="0"/>
-              <a:t>For this example, let’s pretend the </a:t>
-            </a:r>
-            <a:r>
-              <a:rPr lang="en-US" sz="2800" dirty="0" smtClean="0"/>
-              <a:t>authentication </a:t>
-            </a:r>
-            <a:r>
-              <a:rPr lang="en-US" sz="2800" dirty="0" smtClean="0"/>
-              <a:t>of this site is secure …</a:t>
+              <a:t>For this example, let’s pretend the authentication of this site is secure …</a:t>
             </a:r>
             <a:endParaRPr lang="en-US" sz="2800" dirty="0"/>
           </a:p>

</xml_diff>